<commit_message>
Added complete demo app
</commit_message>
<xml_diff>
--- a/MeetASPNETCore.pptx
+++ b/MeetASPNETCore.pptx
@@ -5,19 +5,26 @@
     <p:sldMasterId id="2147483684" r:id="rId1"/>
   </p:sldMasterIdLst>
   <p:sldIdLst>
-    <p:sldId id="256" r:id="rId2"/>
-    <p:sldId id="257" r:id="rId3"/>
-    <p:sldId id="258" r:id="rId4"/>
-    <p:sldId id="266" r:id="rId5"/>
-    <p:sldId id="259" r:id="rId6"/>
-    <p:sldId id="260" r:id="rId7"/>
-    <p:sldId id="261" r:id="rId8"/>
-    <p:sldId id="263" r:id="rId9"/>
-    <p:sldId id="262" r:id="rId10"/>
-    <p:sldId id="264" r:id="rId11"/>
-    <p:sldId id="265" r:id="rId12"/>
-    <p:sldId id="268" r:id="rId13"/>
-    <p:sldId id="267" r:id="rId14"/>
+    <p:sldId id="274" r:id="rId2"/>
+    <p:sldId id="269" r:id="rId3"/>
+    <p:sldId id="270" r:id="rId4"/>
+    <p:sldId id="256" r:id="rId5"/>
+    <p:sldId id="271" r:id="rId6"/>
+    <p:sldId id="272" r:id="rId7"/>
+    <p:sldId id="273" r:id="rId8"/>
+    <p:sldId id="257" r:id="rId9"/>
+    <p:sldId id="258" r:id="rId10"/>
+    <p:sldId id="259" r:id="rId11"/>
+    <p:sldId id="264" r:id="rId12"/>
+    <p:sldId id="266" r:id="rId13"/>
+    <p:sldId id="275" r:id="rId14"/>
+    <p:sldId id="265" r:id="rId15"/>
+    <p:sldId id="263" r:id="rId16"/>
+    <p:sldId id="261" r:id="rId17"/>
+    <p:sldId id="262" r:id="rId18"/>
+    <p:sldId id="276" r:id="rId19"/>
+    <p:sldId id="268" r:id="rId20"/>
+    <p:sldId id="267" r:id="rId21"/>
   </p:sldIdLst>
   <p:sldSz cx="9144000" cy="6858000" type="screen4x3"/>
   <p:notesSz cx="6858000" cy="9144000"/>
@@ -322,7 +329,7 @@
           <a:p>
             <a:fld id="{43AD5F64-D51C-4187-9D29-0224683517B0}" type="datetimeFigureOut">
               <a:rPr lang="en-GB" smtClean="0"/>
-              <a:t>07/06/2016</a:t>
+              <a:t>16/06/2016</a:t>
             </a:fld>
             <a:endParaRPr lang="en-GB"/>
           </a:p>
@@ -487,7 +494,7 @@
           <a:p>
             <a:fld id="{43AD5F64-D51C-4187-9D29-0224683517B0}" type="datetimeFigureOut">
               <a:rPr lang="en-GB" smtClean="0"/>
-              <a:t>07/06/2016</a:t>
+              <a:t>16/06/2016</a:t>
             </a:fld>
             <a:endParaRPr lang="en-GB"/>
           </a:p>
@@ -662,7 +669,7 @@
           <a:p>
             <a:fld id="{43AD5F64-D51C-4187-9D29-0224683517B0}" type="datetimeFigureOut">
               <a:rPr lang="en-GB" smtClean="0"/>
-              <a:t>07/06/2016</a:t>
+              <a:t>16/06/2016</a:t>
             </a:fld>
             <a:endParaRPr lang="en-GB"/>
           </a:p>
@@ -827,7 +834,7 @@
           <a:p>
             <a:fld id="{43AD5F64-D51C-4187-9D29-0224683517B0}" type="datetimeFigureOut">
               <a:rPr lang="en-GB" smtClean="0"/>
-              <a:t>07/06/2016</a:t>
+              <a:t>16/06/2016</a:t>
             </a:fld>
             <a:endParaRPr lang="en-GB"/>
           </a:p>
@@ -1066,7 +1073,7 @@
           <a:p>
             <a:fld id="{43AD5F64-D51C-4187-9D29-0224683517B0}" type="datetimeFigureOut">
               <a:rPr lang="en-GB" smtClean="0"/>
-              <a:t>07/06/2016</a:t>
+              <a:t>16/06/2016</a:t>
             </a:fld>
             <a:endParaRPr lang="en-GB"/>
           </a:p>
@@ -1156,7 +1163,7 @@
           <a:p>
             <a:fld id="{43AD5F64-D51C-4187-9D29-0224683517B0}" type="datetimeFigureOut">
               <a:rPr lang="en-GB" smtClean="0"/>
-              <a:t>07/06/2016</a:t>
+              <a:t>16/06/2016</a:t>
             </a:fld>
             <a:endParaRPr lang="en-GB"/>
           </a:p>
@@ -1530,7 +1537,7 @@
           <a:p>
             <a:fld id="{43AD5F64-D51C-4187-9D29-0224683517B0}" type="datetimeFigureOut">
               <a:rPr lang="en-GB" smtClean="0"/>
-              <a:t>07/06/2016</a:t>
+              <a:t>16/06/2016</a:t>
             </a:fld>
             <a:endParaRPr lang="en-GB"/>
           </a:p>
@@ -1785,7 +1792,7 @@
           <a:p>
             <a:fld id="{43AD5F64-D51C-4187-9D29-0224683517B0}" type="datetimeFigureOut">
               <a:rPr lang="en-GB" smtClean="0"/>
-              <a:t>07/06/2016</a:t>
+              <a:t>16/06/2016</a:t>
             </a:fld>
             <a:endParaRPr lang="en-GB"/>
           </a:p>
@@ -1875,7 +1882,7 @@
           <a:p>
             <a:fld id="{43AD5F64-D51C-4187-9D29-0224683517B0}" type="datetimeFigureOut">
               <a:rPr lang="en-GB" smtClean="0"/>
-              <a:t>07/06/2016</a:t>
+              <a:t>16/06/2016</a:t>
             </a:fld>
             <a:endParaRPr lang="en-GB"/>
           </a:p>
@@ -2149,7 +2156,7 @@
           <a:p>
             <a:fld id="{43AD5F64-D51C-4187-9D29-0224683517B0}" type="datetimeFigureOut">
               <a:rPr lang="en-GB" smtClean="0"/>
-              <a:t>07/06/2016</a:t>
+              <a:t>16/06/2016</a:t>
             </a:fld>
             <a:endParaRPr lang="en-GB"/>
           </a:p>
@@ -2421,7 +2428,7 @@
           <a:p>
             <a:fld id="{43AD5F64-D51C-4187-9D29-0224683517B0}" type="datetimeFigureOut">
               <a:rPr lang="en-GB" smtClean="0"/>
-              <a:t>07/06/2016</a:t>
+              <a:t>16/06/2016</a:t>
             </a:fld>
             <a:endParaRPr lang="en-GB"/>
           </a:p>
@@ -2721,7 +2728,7 @@
           <a:p>
             <a:fld id="{43AD5F64-D51C-4187-9D29-0224683517B0}" type="datetimeFigureOut">
               <a:rPr lang="en-GB" smtClean="0"/>
-              <a:t>07/06/2016</a:t>
+              <a:t>16/06/2016</a:t>
             </a:fld>
             <a:endParaRPr lang="en-GB"/>
           </a:p>
@@ -3192,7 +3199,7 @@
           <a:p>
             <a:r>
               <a:rPr lang="en-GB" b="1" dirty="0" smtClean="0"/>
-              <a:t>Meet ASP.NET Core</a:t>
+              <a:t>Meet Project K</a:t>
             </a:r>
             <a:endParaRPr lang="en-GB" dirty="0"/>
           </a:p>
@@ -3329,7 +3336,7 @@
     </p:spTree>
     <p:extLst>
       <p:ext uri="{BB962C8B-B14F-4D97-AF65-F5344CB8AC3E}">
-        <p14:creationId xmlns:p14="http://schemas.microsoft.com/office/powerpoint/2010/main" val="539964588"/>
+        <p14:creationId xmlns:p14="http://schemas.microsoft.com/office/powerpoint/2010/main" val="2808483685"/>
       </p:ext>
     </p:extLst>
   </p:cSld>
@@ -3380,114 +3387,97 @@
           <a:p>
             <a:r>
               <a:rPr lang="en-GB" dirty="0" smtClean="0"/>
-              <a:t>Anatomy of ASP.NET </a:t>
-            </a:r>
+              <a:t>Getting started the easy way</a:t>
+            </a:r>
+            <a:endParaRPr lang="en-GB" dirty="0"/>
+          </a:p>
+        </p:txBody>
+      </p:sp>
+      <p:sp>
+        <p:nvSpPr>
+          <p:cNvPr id="3" name="Content Placeholder 2"/>
+          <p:cNvSpPr>
+            <a:spLocks noGrp="1"/>
+          </p:cNvSpPr>
+          <p:nvPr>
+            <p:ph idx="1"/>
+          </p:nvPr>
+        </p:nvSpPr>
+        <p:spPr/>
+        <p:txBody>
+          <a:bodyPr/>
+          <a:lstStyle/>
+          <a:p>
             <a:r>
               <a:rPr lang="en-GB" dirty="0" smtClean="0"/>
-              <a:t>Core </a:t>
+              <a:t>Install Visual Studio 2015 (any edition) (Win), or install Visual Studio Code (Win, </a:t>
             </a:r>
             <a:r>
               <a:rPr lang="en-GB" dirty="0" smtClean="0"/>
-              <a:t>app</a:t>
-            </a:r>
+              <a:t>Mac, Linux)</a:t>
+            </a:r>
+            <a:endParaRPr lang="en-GB" dirty="0" smtClean="0"/>
+          </a:p>
+          <a:p>
+            <a:r>
+              <a:rPr lang="en-GB" dirty="0" smtClean="0"/>
+              <a:t>Install ASP.NET Core (Win, </a:t>
+            </a:r>
+            <a:r>
+              <a:rPr lang="en-GB" dirty="0" smtClean="0"/>
+              <a:t>Mac, Linux)</a:t>
+            </a:r>
+            <a:endParaRPr lang="en-GB" dirty="0" smtClean="0"/>
+          </a:p>
+          <a:p>
             <a:endParaRPr lang="en-GB" dirty="0"/>
           </a:p>
-        </p:txBody>
-      </p:sp>
-      <p:sp>
-        <p:nvSpPr>
-          <p:cNvPr id="3" name="Content Placeholder 2"/>
-          <p:cNvSpPr>
-            <a:spLocks noGrp="1"/>
-          </p:cNvSpPr>
-          <p:nvPr>
-            <p:ph idx="1"/>
-          </p:nvPr>
-        </p:nvSpPr>
-        <p:spPr/>
-        <p:txBody>
-          <a:bodyPr>
-            <a:normAutofit fontScale="92500" lnSpcReduction="10000"/>
-          </a:bodyPr>
-          <a:lstStyle/>
-          <a:p>
-            <a:r>
-              <a:rPr lang="en-GB" dirty="0" smtClean="0"/>
-              <a:t>Inspired by OWIN</a:t>
-            </a:r>
-          </a:p>
           <a:p>
             <a:endParaRPr lang="en-GB" dirty="0" smtClean="0"/>
           </a:p>
           <a:p>
-            <a:r>
-              <a:rPr lang="en-GB" dirty="0" err="1" smtClean="0"/>
-              <a:t>Startup</a:t>
-            </a:r>
-            <a:endParaRPr lang="en-GB" dirty="0" smtClean="0"/>
-          </a:p>
-          <a:p>
-            <a:r>
-              <a:rPr lang="en-GB" dirty="0" smtClean="0"/>
-              <a:t>Configure</a:t>
-            </a:r>
-          </a:p>
-          <a:p>
-            <a:pPr lvl="1"/>
-            <a:r>
-              <a:rPr lang="en-GB" dirty="0" smtClean="0"/>
-              <a:t>Middleware</a:t>
-            </a:r>
-          </a:p>
-          <a:p>
-            <a:pPr lvl="1"/>
-            <a:r>
-              <a:rPr lang="en-GB" dirty="0" smtClean="0"/>
-              <a:t>Services</a:t>
-            </a:r>
-          </a:p>
-          <a:p>
-            <a:pPr lvl="1"/>
-            <a:endParaRPr lang="en-GB" dirty="0"/>
-          </a:p>
-          <a:p>
-            <a:r>
-              <a:rPr lang="en-GB" dirty="0" smtClean="0"/>
-              <a:t>Configuration</a:t>
-            </a:r>
-          </a:p>
-          <a:p>
-            <a:r>
-              <a:rPr lang="en-GB" dirty="0" smtClean="0"/>
-              <a:t>Logging</a:t>
-            </a:r>
-          </a:p>
-          <a:p>
-            <a:r>
-              <a:rPr lang="en-GB" dirty="0" smtClean="0"/>
-              <a:t>Dependency Injection</a:t>
-            </a:r>
-          </a:p>
-          <a:p>
-            <a:r>
-              <a:rPr lang="en-GB" dirty="0" smtClean="0"/>
-              <a:t>Environments</a:t>
-            </a:r>
-          </a:p>
-          <a:p>
-            <a:pPr lvl="1"/>
-            <a:endParaRPr lang="en-GB" dirty="0" smtClean="0"/>
-          </a:p>
-          <a:p>
-            <a:pPr lvl="1"/>
-            <a:endParaRPr lang="en-GB" dirty="0"/>
+            <a:pPr marL="45720" indent="0" algn="ctr">
+              <a:buNone/>
+            </a:pPr>
+            <a:r>
+              <a:rPr lang="en-GB" sz="6000" dirty="0" smtClean="0">
+                <a:solidFill>
+                  <a:srgbClr val="00B050"/>
+                </a:solidFill>
+                <a:hlinkClick r:id="rId2"/>
+              </a:rPr>
+              <a:t>http://dot.</a:t>
+            </a:r>
+            <a:r>
+              <a:rPr lang="en-GB" sz="6000" dirty="0" smtClean="0">
+                <a:solidFill>
+                  <a:srgbClr val="00B050"/>
+                </a:solidFill>
+                <a:hlinkClick r:id="rId3"/>
+              </a:rPr>
+              <a:t>n</a:t>
+            </a:r>
+            <a:r>
+              <a:rPr lang="en-GB" sz="6000" dirty="0" smtClean="0">
+                <a:solidFill>
+                  <a:srgbClr val="00B050"/>
+                </a:solidFill>
+                <a:hlinkClick r:id="rId2"/>
+              </a:rPr>
+              <a:t>et</a:t>
+            </a:r>
+            <a:endParaRPr lang="en-GB" sz="6000" dirty="0">
+              <a:solidFill>
+                <a:srgbClr val="00B050"/>
+              </a:solidFill>
+            </a:endParaRPr>
           </a:p>
         </p:txBody>
       </p:sp>
     </p:spTree>
     <p:extLst>
       <p:ext uri="{BB962C8B-B14F-4D97-AF65-F5344CB8AC3E}">
-        <p14:creationId xmlns:p14="http://schemas.microsoft.com/office/powerpoint/2010/main" val="2305498910"/>
+        <p14:creationId xmlns:p14="http://schemas.microsoft.com/office/powerpoint/2010/main" val="1697989239"/>
       </p:ext>
     </p:extLst>
   </p:cSld>
@@ -3538,7 +3528,7 @@
           <a:p>
             <a:r>
               <a:rPr lang="en-GB" dirty="0" smtClean="0"/>
-              <a:t>ASP.NET 5 Servers</a:t>
+              <a:t>Anatomy of ASP.NET Core app</a:t>
             </a:r>
             <a:endParaRPr lang="en-GB" dirty="0"/>
           </a:p>
@@ -3556,29 +3546,48 @@
         </p:nvSpPr>
         <p:spPr/>
         <p:txBody>
-          <a:bodyPr/>
+          <a:bodyPr>
+            <a:normAutofit/>
+          </a:bodyPr>
           <a:lstStyle/>
           <a:p>
             <a:r>
               <a:rPr lang="en-GB" dirty="0" smtClean="0"/>
-              <a:t>IIS: runs ASP.NET 5 on top of IIS</a:t>
-            </a:r>
+              <a:t>Inspired by OWIN</a:t>
+            </a:r>
+          </a:p>
+          <a:p>
+            <a:endParaRPr lang="en-GB" dirty="0" smtClean="0"/>
+          </a:p>
+          <a:p>
+            <a:r>
+              <a:rPr lang="en-GB" dirty="0" err="1" smtClean="0"/>
+              <a:t>Startup</a:t>
+            </a:r>
+            <a:endParaRPr lang="en-GB" dirty="0" smtClean="0"/>
           </a:p>
           <a:p>
             <a:r>
               <a:rPr lang="en-GB" dirty="0" smtClean="0"/>
-              <a:t>WebListener: for self-hosting only on Windows</a:t>
-            </a:r>
-          </a:p>
-          <a:p>
+              <a:t>Configure</a:t>
+            </a:r>
+          </a:p>
+          <a:p>
+            <a:pPr lvl="1"/>
             <a:r>
               <a:rPr lang="en-GB" dirty="0" smtClean="0"/>
-              <a:t>Kestrel: Cross-Platform web server based on </a:t>
-            </a:r>
-            <a:r>
-              <a:rPr lang="en-GB" dirty="0" err="1" smtClean="0"/>
-              <a:t>Libuv</a:t>
-            </a:r>
+              <a:t>Middleware</a:t>
+            </a:r>
+          </a:p>
+          <a:p>
+            <a:pPr lvl="1"/>
+            <a:r>
+              <a:rPr lang="en-GB" dirty="0" smtClean="0"/>
+              <a:t>Services</a:t>
+            </a:r>
+          </a:p>
+          <a:p>
+            <a:pPr lvl="1"/>
             <a:endParaRPr lang="en-GB" dirty="0"/>
           </a:p>
         </p:txBody>
@@ -3586,7 +3595,7 @@
     </p:spTree>
     <p:extLst>
       <p:ext uri="{BB962C8B-B14F-4D97-AF65-F5344CB8AC3E}">
-        <p14:creationId xmlns:p14="http://schemas.microsoft.com/office/powerpoint/2010/main" val="151147797"/>
+        <p14:creationId xmlns:p14="http://schemas.microsoft.com/office/powerpoint/2010/main" val="2305498910"/>
       </p:ext>
     </p:extLst>
   </p:cSld>
@@ -3637,6 +3646,1505 @@
           <a:p>
             <a:r>
               <a:rPr lang="en-GB" dirty="0" smtClean="0"/>
+              <a:t>OWIN Succinctly</a:t>
+            </a:r>
+            <a:endParaRPr lang="en-GB" dirty="0"/>
+          </a:p>
+        </p:txBody>
+      </p:sp>
+      <p:sp>
+        <p:nvSpPr>
+          <p:cNvPr id="3" name="Content Placeholder 2"/>
+          <p:cNvSpPr>
+            <a:spLocks noGrp="1"/>
+          </p:cNvSpPr>
+          <p:nvPr>
+            <p:ph idx="1"/>
+          </p:nvPr>
+        </p:nvSpPr>
+        <p:spPr/>
+        <p:txBody>
+          <a:bodyPr>
+            <a:normAutofit/>
+          </a:bodyPr>
+          <a:lstStyle/>
+          <a:p>
+            <a:endParaRPr lang="en-GB" dirty="0" smtClean="0"/>
+          </a:p>
+          <a:p>
+            <a:pPr marL="45720" indent="0">
+              <a:buNone/>
+            </a:pPr>
+            <a:r>
+              <a:rPr lang="en-GB" dirty="0"/>
+              <a:t>Open Web Interface for .</a:t>
+            </a:r>
+            <a:r>
+              <a:rPr lang="en-GB" dirty="0" smtClean="0"/>
+              <a:t>NET</a:t>
+            </a:r>
+          </a:p>
+          <a:p>
+            <a:pPr marL="45720" indent="0">
+              <a:buNone/>
+            </a:pPr>
+            <a:endParaRPr lang="en-GB" dirty="0" smtClean="0"/>
+          </a:p>
+          <a:p>
+            <a:endParaRPr lang="en-GB" dirty="0"/>
+          </a:p>
+          <a:p>
+            <a:endParaRPr lang="en-GB" dirty="0" smtClean="0"/>
+          </a:p>
+          <a:p>
+            <a:pPr marL="45720" indent="0">
+              <a:buNone/>
+            </a:pPr>
+            <a:endParaRPr lang="en-GB" dirty="0"/>
+          </a:p>
+          <a:p>
+            <a:pPr marL="45720" indent="0">
+              <a:buNone/>
+            </a:pPr>
+            <a:endParaRPr lang="en-GB" dirty="0" smtClean="0"/>
+          </a:p>
+          <a:p>
+            <a:pPr marL="45720" indent="0">
+              <a:buNone/>
+            </a:pPr>
+            <a:r>
+              <a:rPr lang="en-GB" sz="1800" dirty="0" smtClean="0"/>
+              <a:t>https</a:t>
+            </a:r>
+            <a:r>
+              <a:rPr lang="en-GB" sz="1800" dirty="0"/>
+              <a:t>://www.syncfusion.com/resources/techportal/details/ebooks/owin</a:t>
+            </a:r>
+          </a:p>
+        </p:txBody>
+      </p:sp>
+      <p:pic>
+        <p:nvPicPr>
+          <p:cNvPr id="1026" name="Picture 2" descr="https://d2g29cya9iq7ip.cloudfront.net/content/images/downloads/ebooks/owin_Succinctly.png?v=29072015044235"/>
+          <p:cNvPicPr>
+            <a:picLocks noChangeAspect="1" noChangeArrowheads="1"/>
+          </p:cNvPicPr>
+          <p:nvPr/>
+        </p:nvPicPr>
+        <p:blipFill>
+          <a:blip r:embed="rId2">
+            <a:extLst>
+              <a:ext uri="{28A0092B-C50C-407E-A947-70E740481C1C}">
+                <a14:useLocalDpi xmlns:a14="http://schemas.microsoft.com/office/drawing/2010/main" val="0"/>
+              </a:ext>
+            </a:extLst>
+          </a:blip>
+          <a:srcRect/>
+          <a:stretch>
+            <a:fillRect/>
+          </a:stretch>
+        </p:blipFill>
+        <p:spPr bwMode="auto">
+          <a:xfrm>
+            <a:off x="5436096" y="1844824"/>
+            <a:ext cx="2370151" cy="3162844"/>
+          </a:xfrm>
+          <a:prstGeom prst="rect">
+            <a:avLst/>
+          </a:prstGeom>
+          <a:noFill/>
+          <a:extLst>
+            <a:ext uri="{909E8E84-426E-40DD-AFC4-6F175D3DCCD1}">
+              <a14:hiddenFill xmlns:a14="http://schemas.microsoft.com/office/drawing/2010/main">
+                <a:solidFill>
+                  <a:srgbClr val="FFFFFF"/>
+                </a:solidFill>
+              </a14:hiddenFill>
+            </a:ext>
+          </a:extLst>
+        </p:spPr>
+      </p:pic>
+    </p:spTree>
+    <p:extLst>
+      <p:ext uri="{BB962C8B-B14F-4D97-AF65-F5344CB8AC3E}">
+        <p14:creationId xmlns:p14="http://schemas.microsoft.com/office/powerpoint/2010/main" val="1629358162"/>
+      </p:ext>
+    </p:extLst>
+  </p:cSld>
+  <p:clrMapOvr>
+    <a:masterClrMapping/>
+  </p:clrMapOvr>
+  <p:timing>
+    <p:tnLst>
+      <p:par>
+        <p:cTn id="1" dur="indefinite" restart="never" nodeType="tmRoot"/>
+      </p:par>
+    </p:tnLst>
+  </p:timing>
+</p:sld>
+</file>
+
+<file path=ppt/slides/slide13.xml><?xml version="1.0" encoding="utf-8"?>
+<p:sld xmlns:a="http://schemas.openxmlformats.org/drawingml/2006/main" xmlns:r="http://schemas.openxmlformats.org/officeDocument/2006/relationships" xmlns:p="http://schemas.openxmlformats.org/presentationml/2006/main">
+  <p:cSld>
+    <p:spTree>
+      <p:nvGrpSpPr>
+        <p:cNvPr id="1" name=""/>
+        <p:cNvGrpSpPr/>
+        <p:nvPr/>
+      </p:nvGrpSpPr>
+      <p:grpSpPr>
+        <a:xfrm>
+          <a:off x="0" y="0"/>
+          <a:ext cx="0" cy="0"/>
+          <a:chOff x="0" y="0"/>
+          <a:chExt cx="0" cy="0"/>
+        </a:xfrm>
+      </p:grpSpPr>
+      <p:sp>
+        <p:nvSpPr>
+          <p:cNvPr id="2" name="Title 1"/>
+          <p:cNvSpPr>
+            <a:spLocks noGrp="1"/>
+          </p:cNvSpPr>
+          <p:nvPr>
+            <p:ph type="title"/>
+          </p:nvPr>
+        </p:nvSpPr>
+        <p:spPr/>
+        <p:txBody>
+          <a:bodyPr/>
+          <a:lstStyle/>
+          <a:p>
+            <a:r>
+              <a:rPr lang="en-GB" dirty="0"/>
+              <a:t>ASP.NET Core app</a:t>
+            </a:r>
+            <a:endParaRPr lang="en-GB" dirty="0"/>
+          </a:p>
+        </p:txBody>
+      </p:sp>
+      <p:sp>
+        <p:nvSpPr>
+          <p:cNvPr id="4" name="Content Placeholder 3"/>
+          <p:cNvSpPr>
+            <a:spLocks noGrp="1"/>
+          </p:cNvSpPr>
+          <p:nvPr>
+            <p:ph idx="1"/>
+          </p:nvPr>
+        </p:nvSpPr>
+        <p:spPr/>
+        <p:txBody>
+          <a:bodyPr/>
+          <a:lstStyle/>
+          <a:p>
+            <a:endParaRPr lang="en-GB"/>
+          </a:p>
+        </p:txBody>
+      </p:sp>
+    </p:spTree>
+    <p:extLst>
+      <p:ext uri="{BB962C8B-B14F-4D97-AF65-F5344CB8AC3E}">
+        <p14:creationId xmlns:p14="http://schemas.microsoft.com/office/powerpoint/2010/main" val="3266414049"/>
+      </p:ext>
+    </p:extLst>
+  </p:cSld>
+  <p:clrMapOvr>
+    <a:masterClrMapping/>
+  </p:clrMapOvr>
+  <p:timing>
+    <p:tnLst>
+      <p:par>
+        <p:cTn id="1" dur="indefinite" restart="never" nodeType="tmRoot"/>
+      </p:par>
+    </p:tnLst>
+  </p:timing>
+</p:sld>
+</file>
+
+<file path=ppt/slides/slide14.xml><?xml version="1.0" encoding="utf-8"?>
+<p:sld xmlns:a="http://schemas.openxmlformats.org/drawingml/2006/main" xmlns:r="http://schemas.openxmlformats.org/officeDocument/2006/relationships" xmlns:p="http://schemas.openxmlformats.org/presentationml/2006/main">
+  <p:cSld>
+    <p:spTree>
+      <p:nvGrpSpPr>
+        <p:cNvPr id="1" name=""/>
+        <p:cNvGrpSpPr/>
+        <p:nvPr/>
+      </p:nvGrpSpPr>
+      <p:grpSpPr>
+        <a:xfrm>
+          <a:off x="0" y="0"/>
+          <a:ext cx="0" cy="0"/>
+          <a:chOff x="0" y="0"/>
+          <a:chExt cx="0" cy="0"/>
+        </a:xfrm>
+      </p:grpSpPr>
+      <p:sp>
+        <p:nvSpPr>
+          <p:cNvPr id="2" name="Title 1"/>
+          <p:cNvSpPr>
+            <a:spLocks noGrp="1"/>
+          </p:cNvSpPr>
+          <p:nvPr>
+            <p:ph type="title"/>
+          </p:nvPr>
+        </p:nvSpPr>
+        <p:spPr/>
+        <p:txBody>
+          <a:bodyPr/>
+          <a:lstStyle/>
+          <a:p>
+            <a:r>
+              <a:rPr lang="en-GB" dirty="0" smtClean="0"/>
+              <a:t>ASP.NET Core Servers</a:t>
+            </a:r>
+            <a:endParaRPr lang="en-GB" dirty="0"/>
+          </a:p>
+        </p:txBody>
+      </p:sp>
+      <p:sp>
+        <p:nvSpPr>
+          <p:cNvPr id="3" name="Content Placeholder 2"/>
+          <p:cNvSpPr>
+            <a:spLocks noGrp="1"/>
+          </p:cNvSpPr>
+          <p:nvPr>
+            <p:ph idx="1"/>
+          </p:nvPr>
+        </p:nvSpPr>
+        <p:spPr/>
+        <p:txBody>
+          <a:bodyPr/>
+          <a:lstStyle/>
+          <a:p>
+            <a:r>
+              <a:rPr lang="en-GB" dirty="0" smtClean="0"/>
+              <a:t>IIS: runs ASP.NET Core on top of IIS</a:t>
+            </a:r>
+          </a:p>
+          <a:p>
+            <a:r>
+              <a:rPr lang="en-GB" smtClean="0"/>
+              <a:t>Kestrel</a:t>
+            </a:r>
+            <a:r>
+              <a:rPr lang="en-GB" dirty="0" smtClean="0"/>
+              <a:t>: Cross-Platform web server based on </a:t>
+            </a:r>
+            <a:r>
+              <a:rPr lang="en-GB" dirty="0" err="1" smtClean="0"/>
+              <a:t>Libuv</a:t>
+            </a:r>
+            <a:endParaRPr lang="en-GB" dirty="0"/>
+          </a:p>
+        </p:txBody>
+      </p:sp>
+    </p:spTree>
+    <p:extLst>
+      <p:ext uri="{BB962C8B-B14F-4D97-AF65-F5344CB8AC3E}">
+        <p14:creationId xmlns:p14="http://schemas.microsoft.com/office/powerpoint/2010/main" val="151147797"/>
+      </p:ext>
+    </p:extLst>
+  </p:cSld>
+  <p:clrMapOvr>
+    <a:masterClrMapping/>
+  </p:clrMapOvr>
+  <p:timing>
+    <p:tnLst>
+      <p:par>
+        <p:cTn id="1" dur="indefinite" restart="never" nodeType="tmRoot"/>
+      </p:par>
+    </p:tnLst>
+  </p:timing>
+</p:sld>
+</file>
+
+<file path=ppt/slides/slide15.xml><?xml version="1.0" encoding="utf-8"?>
+<p:sld xmlns:a="http://schemas.openxmlformats.org/drawingml/2006/main" xmlns:r="http://schemas.openxmlformats.org/officeDocument/2006/relationships" xmlns:p="http://schemas.openxmlformats.org/presentationml/2006/main">
+  <p:cSld>
+    <p:spTree>
+      <p:nvGrpSpPr>
+        <p:cNvPr id="1" name=""/>
+        <p:cNvGrpSpPr/>
+        <p:nvPr/>
+      </p:nvGrpSpPr>
+      <p:grpSpPr>
+        <a:xfrm>
+          <a:off x="0" y="0"/>
+          <a:ext cx="0" cy="0"/>
+          <a:chOff x="0" y="0"/>
+          <a:chExt cx="0" cy="0"/>
+        </a:xfrm>
+      </p:grpSpPr>
+      <p:sp>
+        <p:nvSpPr>
+          <p:cNvPr id="2" name="Title 1"/>
+          <p:cNvSpPr>
+            <a:spLocks noGrp="1"/>
+          </p:cNvSpPr>
+          <p:nvPr>
+            <p:ph type="title"/>
+          </p:nvPr>
+        </p:nvSpPr>
+        <p:spPr/>
+        <p:txBody>
+          <a:bodyPr/>
+          <a:lstStyle/>
+          <a:p>
+            <a:r>
+              <a:rPr lang="en-GB" dirty="0" smtClean="0"/>
+              <a:t>Console Application</a:t>
+            </a:r>
+            <a:endParaRPr lang="en-GB" dirty="0"/>
+          </a:p>
+        </p:txBody>
+      </p:sp>
+      <p:sp>
+        <p:nvSpPr>
+          <p:cNvPr id="3" name="Content Placeholder 2"/>
+          <p:cNvSpPr>
+            <a:spLocks noGrp="1"/>
+          </p:cNvSpPr>
+          <p:nvPr>
+            <p:ph idx="1"/>
+          </p:nvPr>
+        </p:nvSpPr>
+        <p:spPr/>
+        <p:txBody>
+          <a:bodyPr/>
+          <a:lstStyle/>
+          <a:p>
+            <a:endParaRPr lang="en-GB" dirty="0"/>
+          </a:p>
+        </p:txBody>
+      </p:sp>
+    </p:spTree>
+    <p:extLst>
+      <p:ext uri="{BB962C8B-B14F-4D97-AF65-F5344CB8AC3E}">
+        <p14:creationId xmlns:p14="http://schemas.microsoft.com/office/powerpoint/2010/main" val="2589787921"/>
+      </p:ext>
+    </p:extLst>
+  </p:cSld>
+  <p:clrMapOvr>
+    <a:masterClrMapping/>
+  </p:clrMapOvr>
+  <p:timing>
+    <p:tnLst>
+      <p:par>
+        <p:cTn id="1" dur="indefinite" restart="never" nodeType="tmRoot"/>
+      </p:par>
+    </p:tnLst>
+  </p:timing>
+</p:sld>
+</file>
+
+<file path=ppt/slides/slide16.xml><?xml version="1.0" encoding="utf-8"?>
+<p:sld xmlns:a="http://schemas.openxmlformats.org/drawingml/2006/main" xmlns:r="http://schemas.openxmlformats.org/officeDocument/2006/relationships" xmlns:p="http://schemas.openxmlformats.org/presentationml/2006/main">
+  <p:cSld>
+    <p:spTree>
+      <p:nvGrpSpPr>
+        <p:cNvPr id="1" name=""/>
+        <p:cNvGrpSpPr/>
+        <p:nvPr/>
+      </p:nvGrpSpPr>
+      <p:grpSpPr>
+        <a:xfrm>
+          <a:off x="0" y="0"/>
+          <a:ext cx="0" cy="0"/>
+          <a:chOff x="0" y="0"/>
+          <a:chExt cx="0" cy="0"/>
+        </a:xfrm>
+      </p:grpSpPr>
+      <p:sp>
+        <p:nvSpPr>
+          <p:cNvPr id="2" name="Title 1"/>
+          <p:cNvSpPr>
+            <a:spLocks noGrp="1"/>
+          </p:cNvSpPr>
+          <p:nvPr>
+            <p:ph type="title"/>
+          </p:nvPr>
+        </p:nvSpPr>
+        <p:spPr/>
+        <p:txBody>
+          <a:bodyPr/>
+          <a:lstStyle/>
+          <a:p>
+            <a:r>
+              <a:rPr lang="en-GB" dirty="0" err="1" smtClean="0">
+                <a:latin typeface="Consolas" panose="020B0609020204030204" pitchFamily="49" charset="0"/>
+              </a:rPr>
+              <a:t>donet</a:t>
+            </a:r>
+            <a:r>
+              <a:rPr lang="en-GB" dirty="0" smtClean="0">
+                <a:latin typeface="Consolas" panose="020B0609020204030204" pitchFamily="49" charset="0"/>
+              </a:rPr>
+              <a:t>-cli</a:t>
+            </a:r>
+            <a:endParaRPr lang="en-GB" dirty="0">
+              <a:latin typeface="Consolas" panose="020B0609020204030204" pitchFamily="49" charset="0"/>
+            </a:endParaRPr>
+          </a:p>
+        </p:txBody>
+      </p:sp>
+      <p:sp>
+        <p:nvSpPr>
+          <p:cNvPr id="3" name="Content Placeholder 2"/>
+          <p:cNvSpPr>
+            <a:spLocks noGrp="1"/>
+          </p:cNvSpPr>
+          <p:nvPr>
+            <p:ph idx="1"/>
+          </p:nvPr>
+        </p:nvSpPr>
+        <p:spPr/>
+        <p:txBody>
+          <a:bodyPr/>
+          <a:lstStyle/>
+          <a:p>
+            <a:r>
+              <a:rPr lang="en-GB" dirty="0" err="1">
+                <a:latin typeface="Consolas" panose="020B0609020204030204" pitchFamily="49" charset="0"/>
+              </a:rPr>
+              <a:t>dotnet</a:t>
+            </a:r>
+            <a:r>
+              <a:rPr lang="en-GB" dirty="0">
+                <a:latin typeface="Consolas" panose="020B0609020204030204" pitchFamily="49" charset="0"/>
+              </a:rPr>
+              <a:t> </a:t>
+            </a:r>
+            <a:r>
+              <a:rPr lang="en-GB" dirty="0" smtClean="0">
+                <a:latin typeface="Consolas" panose="020B0609020204030204" pitchFamily="49" charset="0"/>
+              </a:rPr>
+              <a:t>new </a:t>
+            </a:r>
+            <a:r>
+              <a:rPr lang="en-GB" dirty="0"/>
+              <a:t>– </a:t>
+            </a:r>
+            <a:r>
+              <a:rPr lang="en-GB" dirty="0" smtClean="0"/>
+              <a:t>new project</a:t>
+            </a:r>
+            <a:endParaRPr lang="en-GB" dirty="0" smtClean="0">
+              <a:latin typeface="Consolas" panose="020B0609020204030204" pitchFamily="49" charset="0"/>
+            </a:endParaRPr>
+          </a:p>
+          <a:p>
+            <a:r>
+              <a:rPr lang="en-GB" dirty="0" err="1" smtClean="0">
+                <a:latin typeface="Consolas" panose="020B0609020204030204" pitchFamily="49" charset="0"/>
+              </a:rPr>
+              <a:t>dotnet</a:t>
+            </a:r>
+            <a:r>
+              <a:rPr lang="en-GB" dirty="0" smtClean="0">
+                <a:latin typeface="Consolas" panose="020B0609020204030204" pitchFamily="49" charset="0"/>
+              </a:rPr>
+              <a:t> restore </a:t>
+            </a:r>
+            <a:r>
+              <a:rPr lang="en-GB" dirty="0" smtClean="0"/>
+              <a:t>– restore packages</a:t>
+            </a:r>
+          </a:p>
+          <a:p>
+            <a:r>
+              <a:rPr lang="en-GB" dirty="0" err="1" smtClean="0">
+                <a:latin typeface="Consolas" panose="020B0609020204030204" pitchFamily="49" charset="0"/>
+              </a:rPr>
+              <a:t>dotnet</a:t>
+            </a:r>
+            <a:r>
+              <a:rPr lang="en-GB" dirty="0" smtClean="0">
+                <a:latin typeface="Consolas" panose="020B0609020204030204" pitchFamily="49" charset="0"/>
+              </a:rPr>
+              <a:t> run </a:t>
+            </a:r>
+            <a:r>
+              <a:rPr lang="en-GB" dirty="0" smtClean="0"/>
+              <a:t>– compiles and runs</a:t>
+            </a:r>
+          </a:p>
+          <a:p>
+            <a:r>
+              <a:rPr lang="en-GB" dirty="0" err="1" smtClean="0">
+                <a:latin typeface="Consolas" panose="020B0609020204030204" pitchFamily="49" charset="0"/>
+              </a:rPr>
+              <a:t>dotnet</a:t>
+            </a:r>
+            <a:r>
+              <a:rPr lang="en-GB" dirty="0" smtClean="0">
+                <a:latin typeface="Consolas" panose="020B0609020204030204" pitchFamily="49" charset="0"/>
+              </a:rPr>
+              <a:t> build </a:t>
+            </a:r>
+            <a:r>
+              <a:rPr lang="en-GB" dirty="0" smtClean="0"/>
+              <a:t>– compiles as IL </a:t>
+            </a:r>
+          </a:p>
+          <a:p>
+            <a:r>
+              <a:rPr lang="en-GB" dirty="0" err="1">
+                <a:latin typeface="Consolas" panose="020B0609020204030204" pitchFamily="49" charset="0"/>
+              </a:rPr>
+              <a:t>dotnet</a:t>
+            </a:r>
+            <a:r>
+              <a:rPr lang="en-GB" dirty="0">
+                <a:latin typeface="Consolas" panose="020B0609020204030204" pitchFamily="49" charset="0"/>
+              </a:rPr>
+              <a:t> </a:t>
+            </a:r>
+            <a:r>
+              <a:rPr lang="en-GB" dirty="0" smtClean="0">
+                <a:latin typeface="Consolas" panose="020B0609020204030204" pitchFamily="49" charset="0"/>
+              </a:rPr>
+              <a:t>build </a:t>
+            </a:r>
+            <a:r>
+              <a:rPr lang="en-GB" dirty="0" smtClean="0"/>
+              <a:t>– </a:t>
+            </a:r>
+            <a:r>
+              <a:rPr lang="en-GB" dirty="0"/>
+              <a:t>compiles as </a:t>
+            </a:r>
+            <a:r>
+              <a:rPr lang="en-GB" dirty="0" smtClean="0"/>
+              <a:t>native </a:t>
+            </a:r>
+            <a:r>
+              <a:rPr lang="en-GB" dirty="0" smtClean="0"/>
+              <a:t>app (with correct </a:t>
+            </a:r>
+            <a:r>
+              <a:rPr lang="en-GB" dirty="0" err="1" smtClean="0"/>
+              <a:t>config</a:t>
+            </a:r>
+            <a:r>
+              <a:rPr lang="en-GB" dirty="0" smtClean="0"/>
+              <a:t>)</a:t>
+            </a:r>
+            <a:endParaRPr lang="en-GB" dirty="0"/>
+          </a:p>
+        </p:txBody>
+      </p:sp>
+    </p:spTree>
+    <p:extLst>
+      <p:ext uri="{BB962C8B-B14F-4D97-AF65-F5344CB8AC3E}">
+        <p14:creationId xmlns:p14="http://schemas.microsoft.com/office/powerpoint/2010/main" val="1496549051"/>
+      </p:ext>
+    </p:extLst>
+  </p:cSld>
+  <p:clrMapOvr>
+    <a:masterClrMapping/>
+  </p:clrMapOvr>
+  <p:timing>
+    <p:tnLst>
+      <p:par>
+        <p:cTn id="1" dur="indefinite" restart="never" nodeType="tmRoot"/>
+      </p:par>
+    </p:tnLst>
+  </p:timing>
+</p:sld>
+</file>
+
+<file path=ppt/slides/slide17.xml><?xml version="1.0" encoding="utf-8"?>
+<p:sld xmlns:a="http://schemas.openxmlformats.org/drawingml/2006/main" xmlns:r="http://schemas.openxmlformats.org/officeDocument/2006/relationships" xmlns:p="http://schemas.openxmlformats.org/presentationml/2006/main">
+  <p:cSld>
+    <p:spTree>
+      <p:nvGrpSpPr>
+        <p:cNvPr id="1" name=""/>
+        <p:cNvGrpSpPr/>
+        <p:nvPr/>
+      </p:nvGrpSpPr>
+      <p:grpSpPr>
+        <a:xfrm>
+          <a:off x="0" y="0"/>
+          <a:ext cx="0" cy="0"/>
+          <a:chOff x="0" y="0"/>
+          <a:chExt cx="0" cy="0"/>
+        </a:xfrm>
+      </p:grpSpPr>
+      <p:sp>
+        <p:nvSpPr>
+          <p:cNvPr id="2" name="Title 1"/>
+          <p:cNvSpPr>
+            <a:spLocks noGrp="1"/>
+          </p:cNvSpPr>
+          <p:nvPr>
+            <p:ph type="title"/>
+          </p:nvPr>
+        </p:nvSpPr>
+        <p:spPr/>
+        <p:txBody>
+          <a:bodyPr/>
+          <a:lstStyle/>
+          <a:p>
+            <a:r>
+              <a:rPr lang="en-GB" dirty="0" err="1" smtClean="0"/>
+              <a:t>Project.json</a:t>
+            </a:r>
+            <a:endParaRPr lang="en-GB" dirty="0"/>
+          </a:p>
+        </p:txBody>
+      </p:sp>
+      <p:sp>
+        <p:nvSpPr>
+          <p:cNvPr id="3" name="Content Placeholder 2"/>
+          <p:cNvSpPr>
+            <a:spLocks noGrp="1"/>
+          </p:cNvSpPr>
+          <p:nvPr>
+            <p:ph idx="1"/>
+          </p:nvPr>
+        </p:nvSpPr>
+        <p:spPr>
+          <a:xfrm>
+            <a:off x="914400" y="2769833"/>
+            <a:ext cx="2793504" cy="3539527"/>
+          </a:xfrm>
+        </p:spPr>
+        <p:txBody>
+          <a:bodyPr/>
+          <a:lstStyle/>
+          <a:p>
+            <a:r>
+              <a:rPr lang="en-GB" dirty="0" smtClean="0"/>
+              <a:t>Metadata</a:t>
+            </a:r>
+          </a:p>
+          <a:p>
+            <a:r>
+              <a:rPr lang="en-GB" dirty="0" smtClean="0"/>
+              <a:t>Dependencies</a:t>
+            </a:r>
+          </a:p>
+          <a:p>
+            <a:r>
+              <a:rPr lang="en-GB" dirty="0" smtClean="0"/>
+              <a:t>Frameworks</a:t>
+            </a:r>
+          </a:p>
+          <a:p>
+            <a:r>
+              <a:rPr lang="en-GB" dirty="0" smtClean="0"/>
+              <a:t>Commands</a:t>
+            </a:r>
+          </a:p>
+          <a:p>
+            <a:r>
+              <a:rPr lang="en-GB" dirty="0" smtClean="0"/>
+              <a:t>Configuration</a:t>
+            </a:r>
+          </a:p>
+          <a:p>
+            <a:r>
+              <a:rPr lang="en-GB" dirty="0" smtClean="0"/>
+              <a:t>Source files</a:t>
+            </a:r>
+          </a:p>
+          <a:p>
+            <a:r>
+              <a:rPr lang="en-GB" dirty="0" smtClean="0"/>
+              <a:t>Scripts</a:t>
+            </a:r>
+          </a:p>
+          <a:p>
+            <a:endParaRPr lang="en-GB" dirty="0"/>
+          </a:p>
+        </p:txBody>
+      </p:sp>
+      <p:sp>
+        <p:nvSpPr>
+          <p:cNvPr id="4" name="TextBox 3"/>
+          <p:cNvSpPr txBox="1"/>
+          <p:nvPr/>
+        </p:nvSpPr>
+        <p:spPr>
+          <a:xfrm>
+            <a:off x="3707904" y="836712"/>
+            <a:ext cx="5616624" cy="6063198"/>
+          </a:xfrm>
+          <a:prstGeom prst="rect">
+            <a:avLst/>
+          </a:prstGeom>
+          <a:noFill/>
+        </p:spPr>
+        <p:txBody>
+          <a:bodyPr wrap="square" rtlCol="0">
+            <a:spAutoFit/>
+          </a:bodyPr>
+          <a:lstStyle/>
+          <a:p>
+            <a:r>
+              <a:rPr lang="en-GB" sz="900" dirty="0">
+                <a:latin typeface="Consolas" panose="020B0609020204030204" pitchFamily="49" charset="0"/>
+              </a:rPr>
+              <a:t>{</a:t>
+            </a:r>
+          </a:p>
+          <a:p>
+            <a:r>
+              <a:rPr lang="en-GB" sz="900" dirty="0">
+                <a:latin typeface="Consolas" panose="020B0609020204030204" pitchFamily="49" charset="0"/>
+              </a:rPr>
+              <a:t>  "version": "1.0.0-</a:t>
+            </a:r>
+            <a:r>
+              <a:rPr lang="en-GB" sz="900" dirty="0" smtClean="0">
+                <a:latin typeface="Consolas" panose="020B0609020204030204" pitchFamily="49" charset="0"/>
+              </a:rPr>
+              <a:t>*",</a:t>
+            </a:r>
+          </a:p>
+          <a:p>
+            <a:r>
+              <a:rPr lang="en-GB" sz="900" dirty="0">
+                <a:latin typeface="Consolas" panose="020B0609020204030204" pitchFamily="49" charset="0"/>
+              </a:rPr>
+              <a:t> </a:t>
+            </a:r>
+            <a:r>
+              <a:rPr lang="en-GB" sz="900" dirty="0" smtClean="0">
+                <a:latin typeface="Consolas" panose="020B0609020204030204" pitchFamily="49" charset="0"/>
+              </a:rPr>
+              <a:t> "author": </a:t>
+            </a:r>
+            <a:r>
+              <a:rPr lang="en-GB" sz="900" dirty="0">
+                <a:latin typeface="Consolas" panose="020B0609020204030204" pitchFamily="49" charset="0"/>
+              </a:rPr>
+              <a:t>"</a:t>
+            </a:r>
+            <a:r>
+              <a:rPr lang="en-GB" sz="900" dirty="0" smtClean="0">
+                <a:latin typeface="Consolas" panose="020B0609020204030204" pitchFamily="49" charset="0"/>
+              </a:rPr>
+              <a:t>Simone Chiaretta“,</a:t>
+            </a:r>
+            <a:endParaRPr lang="en-GB" sz="900" dirty="0">
+              <a:latin typeface="Consolas" panose="020B0609020204030204" pitchFamily="49" charset="0"/>
+            </a:endParaRPr>
+          </a:p>
+          <a:p>
+            <a:endParaRPr lang="en-GB" sz="900" dirty="0">
+              <a:latin typeface="Consolas" panose="020B0609020204030204" pitchFamily="49" charset="0"/>
+            </a:endParaRPr>
+          </a:p>
+          <a:p>
+            <a:r>
+              <a:rPr lang="en-GB" sz="900" dirty="0">
+                <a:latin typeface="Consolas" panose="020B0609020204030204" pitchFamily="49" charset="0"/>
+              </a:rPr>
+              <a:t>  "dependencies": </a:t>
+            </a:r>
+            <a:r>
+              <a:rPr lang="en-GB" sz="900" dirty="0" smtClean="0">
+                <a:latin typeface="Consolas" panose="020B0609020204030204" pitchFamily="49" charset="0"/>
+              </a:rPr>
+              <a:t>{</a:t>
+            </a:r>
+          </a:p>
+          <a:p>
+            <a:r>
+              <a:rPr lang="en-GB" sz="900" dirty="0">
+                <a:latin typeface="Consolas" panose="020B0609020204030204" pitchFamily="49" charset="0"/>
+              </a:rPr>
+              <a:t> </a:t>
+            </a:r>
+            <a:r>
+              <a:rPr lang="en-GB" sz="900" dirty="0" smtClean="0">
+                <a:latin typeface="Consolas" panose="020B0609020204030204" pitchFamily="49" charset="0"/>
+              </a:rPr>
+              <a:t>   "</a:t>
+            </a:r>
+            <a:r>
+              <a:rPr lang="en-GB" sz="900" dirty="0" err="1">
+                <a:latin typeface="Consolas" panose="020B0609020204030204" pitchFamily="49" charset="0"/>
+              </a:rPr>
+              <a:t>Microsoft.NETCore.App</a:t>
+            </a:r>
+            <a:r>
+              <a:rPr lang="en-GB" sz="900" dirty="0">
+                <a:latin typeface="Consolas" panose="020B0609020204030204" pitchFamily="49" charset="0"/>
+              </a:rPr>
+              <a:t>": {</a:t>
+            </a:r>
+          </a:p>
+          <a:p>
+            <a:r>
+              <a:rPr lang="en-GB" sz="900" dirty="0">
+                <a:latin typeface="Consolas" panose="020B0609020204030204" pitchFamily="49" charset="0"/>
+              </a:rPr>
+              <a:t>      "version": "1.0.0-rc2-3002702",</a:t>
+            </a:r>
+          </a:p>
+          <a:p>
+            <a:r>
+              <a:rPr lang="en-GB" sz="900" dirty="0">
+                <a:latin typeface="Consolas" panose="020B0609020204030204" pitchFamily="49" charset="0"/>
+              </a:rPr>
+              <a:t>      "type": "platform"</a:t>
+            </a:r>
+          </a:p>
+          <a:p>
+            <a:r>
+              <a:rPr lang="en-GB" sz="900" dirty="0">
+                <a:latin typeface="Consolas" panose="020B0609020204030204" pitchFamily="49" charset="0"/>
+              </a:rPr>
+              <a:t>    },</a:t>
+            </a:r>
+            <a:endParaRPr lang="en-GB" sz="900" dirty="0" smtClean="0">
+              <a:latin typeface="Consolas" panose="020B0609020204030204" pitchFamily="49" charset="0"/>
+            </a:endParaRPr>
+          </a:p>
+          <a:p>
+            <a:r>
+              <a:rPr lang="en-GB" sz="900" dirty="0" smtClean="0">
+                <a:latin typeface="Consolas" panose="020B0609020204030204" pitchFamily="49" charset="0"/>
+              </a:rPr>
+              <a:t>    </a:t>
+            </a:r>
+            <a:r>
+              <a:rPr lang="en-GB" sz="900" dirty="0">
+                <a:latin typeface="Consolas" panose="020B0609020204030204" pitchFamily="49" charset="0"/>
+              </a:rPr>
+              <a:t>"</a:t>
+            </a:r>
+            <a:r>
+              <a:rPr lang="en-GB" sz="900" dirty="0" err="1">
+                <a:latin typeface="Consolas" panose="020B0609020204030204" pitchFamily="49" charset="0"/>
+              </a:rPr>
+              <a:t>Microsoft.AspNet.Diagnostics</a:t>
+            </a:r>
+            <a:r>
+              <a:rPr lang="en-GB" sz="900" dirty="0">
+                <a:latin typeface="Consolas" panose="020B0609020204030204" pitchFamily="49" charset="0"/>
+              </a:rPr>
+              <a:t>": "</a:t>
+            </a:r>
+            <a:r>
+              <a:rPr lang="en-GB" sz="900" dirty="0" smtClean="0">
+                <a:latin typeface="Consolas" panose="020B0609020204030204" pitchFamily="49" charset="0"/>
+              </a:rPr>
+              <a:t>1.0.0-rc2-final</a:t>
+            </a:r>
+            <a:r>
+              <a:rPr lang="en-GB" sz="900" dirty="0">
+                <a:latin typeface="Consolas" panose="020B0609020204030204" pitchFamily="49" charset="0"/>
+              </a:rPr>
+              <a:t>",</a:t>
+            </a:r>
+          </a:p>
+          <a:p>
+            <a:r>
+              <a:rPr lang="en-GB" sz="900" dirty="0">
+                <a:latin typeface="Consolas" panose="020B0609020204030204" pitchFamily="49" charset="0"/>
+              </a:rPr>
+              <a:t>    "</a:t>
+            </a:r>
+            <a:r>
+              <a:rPr lang="en-GB" sz="900" dirty="0" err="1">
+                <a:latin typeface="Consolas" panose="020B0609020204030204" pitchFamily="49" charset="0"/>
+              </a:rPr>
+              <a:t>Microsoft.AspNet.IISPlatformHandler</a:t>
+            </a:r>
+            <a:r>
+              <a:rPr lang="en-GB" sz="900" dirty="0">
+                <a:latin typeface="Consolas" panose="020B0609020204030204" pitchFamily="49" charset="0"/>
+              </a:rPr>
+              <a:t>": "</a:t>
+            </a:r>
+            <a:r>
+              <a:rPr lang="en-GB" sz="900" dirty="0" smtClean="0">
+                <a:latin typeface="Consolas" panose="020B0609020204030204" pitchFamily="49" charset="0"/>
+              </a:rPr>
+              <a:t>1.0.0-rc2-final</a:t>
+            </a:r>
+            <a:r>
+              <a:rPr lang="en-GB" sz="900" dirty="0">
+                <a:latin typeface="Consolas" panose="020B0609020204030204" pitchFamily="49" charset="0"/>
+              </a:rPr>
+              <a:t>",</a:t>
+            </a:r>
+          </a:p>
+          <a:p>
+            <a:r>
+              <a:rPr lang="en-GB" sz="900" dirty="0" smtClean="0">
+                <a:latin typeface="Consolas" panose="020B0609020204030204" pitchFamily="49" charset="0"/>
+              </a:rPr>
+              <a:t>    ...,</a:t>
+            </a:r>
+          </a:p>
+          <a:p>
+            <a:r>
+              <a:rPr lang="en-GB" sz="900" dirty="0">
+                <a:latin typeface="Consolas" panose="020B0609020204030204" pitchFamily="49" charset="0"/>
+              </a:rPr>
+              <a:t> </a:t>
+            </a:r>
+            <a:r>
+              <a:rPr lang="en-GB" sz="900" dirty="0" smtClean="0">
+                <a:latin typeface="Consolas" panose="020B0609020204030204" pitchFamily="49" charset="0"/>
+              </a:rPr>
+              <a:t>   "</a:t>
+            </a:r>
+            <a:r>
+              <a:rPr lang="en-GB" sz="900" dirty="0" err="1">
+                <a:latin typeface="Consolas" panose="020B0609020204030204" pitchFamily="49" charset="0"/>
+              </a:rPr>
+              <a:t>Microsoft.VisualStudio.Web.BrowserLink.Loader</a:t>
+            </a:r>
+            <a:r>
+              <a:rPr lang="en-GB" sz="900" dirty="0">
+                <a:latin typeface="Consolas" panose="020B0609020204030204" pitchFamily="49" charset="0"/>
+              </a:rPr>
+              <a:t>": "</a:t>
+            </a:r>
+            <a:r>
+              <a:rPr lang="en-GB" sz="900" dirty="0" smtClean="0">
+                <a:latin typeface="Consolas" panose="020B0609020204030204" pitchFamily="49" charset="0"/>
+              </a:rPr>
+              <a:t>14.0.0-rc2-final</a:t>
+            </a:r>
+            <a:r>
+              <a:rPr lang="en-GB" sz="900" dirty="0">
+                <a:latin typeface="Consolas" panose="020B0609020204030204" pitchFamily="49" charset="0"/>
+              </a:rPr>
+              <a:t>"</a:t>
+            </a:r>
+          </a:p>
+          <a:p>
+            <a:r>
+              <a:rPr lang="en-GB" sz="900" dirty="0">
+                <a:latin typeface="Consolas" panose="020B0609020204030204" pitchFamily="49" charset="0"/>
+              </a:rPr>
+              <a:t>  </a:t>
+            </a:r>
+            <a:r>
+              <a:rPr lang="en-GB" sz="900" dirty="0" smtClean="0">
+                <a:latin typeface="Consolas" panose="020B0609020204030204" pitchFamily="49" charset="0"/>
+              </a:rPr>
+              <a:t>},</a:t>
+            </a:r>
+          </a:p>
+          <a:p>
+            <a:r>
+              <a:rPr lang="en-GB" sz="900" dirty="0">
+                <a:latin typeface="Consolas" panose="020B0609020204030204" pitchFamily="49" charset="0"/>
+              </a:rPr>
+              <a:t> "frameworks": {</a:t>
+            </a:r>
+          </a:p>
+          <a:p>
+            <a:r>
+              <a:rPr lang="en-GB" sz="900" dirty="0">
+                <a:latin typeface="Consolas" panose="020B0609020204030204" pitchFamily="49" charset="0"/>
+              </a:rPr>
+              <a:t>    "netcoreapp1.0": {</a:t>
+            </a:r>
+          </a:p>
+          <a:p>
+            <a:r>
+              <a:rPr lang="en-GB" sz="900" dirty="0">
+                <a:latin typeface="Consolas" panose="020B0609020204030204" pitchFamily="49" charset="0"/>
+              </a:rPr>
+              <a:t>      "imports": [</a:t>
+            </a:r>
+          </a:p>
+          <a:p>
+            <a:r>
+              <a:rPr lang="en-GB" sz="900" dirty="0">
+                <a:latin typeface="Consolas" panose="020B0609020204030204" pitchFamily="49" charset="0"/>
+              </a:rPr>
+              <a:t>        "dotnet5.6",</a:t>
+            </a:r>
+          </a:p>
+          <a:p>
+            <a:r>
+              <a:rPr lang="en-GB" sz="900" dirty="0">
+                <a:latin typeface="Consolas" panose="020B0609020204030204" pitchFamily="49" charset="0"/>
+              </a:rPr>
+              <a:t>        "dnxcore50",</a:t>
+            </a:r>
+          </a:p>
+          <a:p>
+            <a:r>
+              <a:rPr lang="en-GB" sz="900" dirty="0">
+                <a:latin typeface="Consolas" panose="020B0609020204030204" pitchFamily="49" charset="0"/>
+              </a:rPr>
+              <a:t>        "portable-net45+win8"</a:t>
+            </a:r>
+          </a:p>
+          <a:p>
+            <a:r>
+              <a:rPr lang="en-GB" sz="900" dirty="0">
+                <a:latin typeface="Consolas" panose="020B0609020204030204" pitchFamily="49" charset="0"/>
+              </a:rPr>
+              <a:t>      ]</a:t>
+            </a:r>
+          </a:p>
+          <a:p>
+            <a:r>
+              <a:rPr lang="en-GB" sz="900" dirty="0">
+                <a:latin typeface="Consolas" panose="020B0609020204030204" pitchFamily="49" charset="0"/>
+              </a:rPr>
+              <a:t>    }</a:t>
+            </a:r>
+          </a:p>
+          <a:p>
+            <a:r>
+              <a:rPr lang="en-GB" sz="900" dirty="0">
+                <a:latin typeface="Consolas" panose="020B0609020204030204" pitchFamily="49" charset="0"/>
+              </a:rPr>
+              <a:t>  },</a:t>
+            </a:r>
+            <a:endParaRPr lang="en-GB" sz="900" dirty="0">
+              <a:latin typeface="Consolas" panose="020B0609020204030204" pitchFamily="49" charset="0"/>
+            </a:endParaRPr>
+          </a:p>
+          <a:p>
+            <a:r>
+              <a:rPr lang="en-GB" sz="900" dirty="0">
+                <a:latin typeface="Consolas" panose="020B0609020204030204" pitchFamily="49" charset="0"/>
+              </a:rPr>
+              <a:t>  "commands": {</a:t>
+            </a:r>
+          </a:p>
+          <a:p>
+            <a:r>
+              <a:rPr lang="en-GB" sz="900" dirty="0">
+                <a:latin typeface="Consolas" panose="020B0609020204030204" pitchFamily="49" charset="0"/>
+              </a:rPr>
+              <a:t>    "web": "</a:t>
+            </a:r>
+            <a:r>
+              <a:rPr lang="en-GB" sz="900" dirty="0" err="1">
+                <a:latin typeface="Consolas" panose="020B0609020204030204" pitchFamily="49" charset="0"/>
+              </a:rPr>
+              <a:t>Microsoft.AspNet.Server.Kestrel</a:t>
+            </a:r>
+            <a:r>
+              <a:rPr lang="en-GB" sz="900" dirty="0">
+                <a:latin typeface="Consolas" panose="020B0609020204030204" pitchFamily="49" charset="0"/>
+              </a:rPr>
+              <a:t>"</a:t>
+            </a:r>
+          </a:p>
+          <a:p>
+            <a:r>
+              <a:rPr lang="en-GB" sz="900" dirty="0">
+                <a:latin typeface="Consolas" panose="020B0609020204030204" pitchFamily="49" charset="0"/>
+              </a:rPr>
+              <a:t>  },</a:t>
+            </a:r>
+          </a:p>
+          <a:p>
+            <a:r>
+              <a:rPr lang="en-GB" sz="900" dirty="0">
+                <a:latin typeface="Consolas" panose="020B0609020204030204" pitchFamily="49" charset="0"/>
+              </a:rPr>
+              <a:t> </a:t>
+            </a:r>
+            <a:r>
+              <a:rPr lang="en-GB" sz="900" dirty="0" smtClean="0">
+                <a:latin typeface="Consolas" panose="020B0609020204030204" pitchFamily="49" charset="0"/>
+              </a:rPr>
+              <a:t> "</a:t>
+            </a:r>
+            <a:r>
+              <a:rPr lang="en-GB" sz="900" dirty="0" err="1">
+                <a:latin typeface="Consolas" panose="020B0609020204030204" pitchFamily="49" charset="0"/>
+              </a:rPr>
+              <a:t>compilationOptions</a:t>
+            </a:r>
+            <a:r>
+              <a:rPr lang="en-GB" sz="900" dirty="0">
+                <a:latin typeface="Consolas" panose="020B0609020204030204" pitchFamily="49" charset="0"/>
+              </a:rPr>
+              <a:t>": {</a:t>
+            </a:r>
+          </a:p>
+          <a:p>
+            <a:r>
+              <a:rPr lang="en-GB" sz="900" dirty="0">
+                <a:latin typeface="Consolas" panose="020B0609020204030204" pitchFamily="49" charset="0"/>
+              </a:rPr>
+              <a:t>    "</a:t>
+            </a:r>
+            <a:r>
+              <a:rPr lang="en-GB" sz="900" dirty="0" err="1">
+                <a:latin typeface="Consolas" panose="020B0609020204030204" pitchFamily="49" charset="0"/>
+              </a:rPr>
+              <a:t>emitEntryPoint</a:t>
+            </a:r>
+            <a:r>
+              <a:rPr lang="en-GB" sz="900" dirty="0">
+                <a:latin typeface="Consolas" panose="020B0609020204030204" pitchFamily="49" charset="0"/>
+              </a:rPr>
+              <a:t>": true</a:t>
+            </a:r>
+          </a:p>
+          <a:p>
+            <a:r>
+              <a:rPr lang="en-GB" sz="900" dirty="0">
+                <a:latin typeface="Consolas" panose="020B0609020204030204" pitchFamily="49" charset="0"/>
+              </a:rPr>
+              <a:t>  },</a:t>
+            </a:r>
+          </a:p>
+          <a:p>
+            <a:endParaRPr lang="en-GB" sz="900" dirty="0">
+              <a:latin typeface="Consolas" panose="020B0609020204030204" pitchFamily="49" charset="0"/>
+            </a:endParaRPr>
+          </a:p>
+          <a:p>
+            <a:r>
+              <a:rPr lang="en-GB" sz="900" dirty="0">
+                <a:latin typeface="Consolas" panose="020B0609020204030204" pitchFamily="49" charset="0"/>
+              </a:rPr>
+              <a:t>  "exclude": [</a:t>
+            </a:r>
+          </a:p>
+          <a:p>
+            <a:r>
+              <a:rPr lang="en-GB" sz="900" dirty="0">
+                <a:latin typeface="Consolas" panose="020B0609020204030204" pitchFamily="49" charset="0"/>
+              </a:rPr>
+              <a:t>    "</a:t>
+            </a:r>
+            <a:r>
+              <a:rPr lang="en-GB" sz="900" dirty="0" err="1">
+                <a:latin typeface="Consolas" panose="020B0609020204030204" pitchFamily="49" charset="0"/>
+              </a:rPr>
+              <a:t>wwwroot</a:t>
+            </a:r>
+            <a:r>
+              <a:rPr lang="en-GB" sz="900" dirty="0">
+                <a:latin typeface="Consolas" panose="020B0609020204030204" pitchFamily="49" charset="0"/>
+              </a:rPr>
+              <a:t>",</a:t>
+            </a:r>
+          </a:p>
+          <a:p>
+            <a:r>
+              <a:rPr lang="en-GB" sz="900" dirty="0">
+                <a:latin typeface="Consolas" panose="020B0609020204030204" pitchFamily="49" charset="0"/>
+              </a:rPr>
+              <a:t>    "</a:t>
+            </a:r>
+            <a:r>
+              <a:rPr lang="en-GB" sz="900" dirty="0" err="1">
+                <a:latin typeface="Consolas" panose="020B0609020204030204" pitchFamily="49" charset="0"/>
+              </a:rPr>
+              <a:t>node_modules</a:t>
+            </a:r>
+            <a:r>
+              <a:rPr lang="en-GB" sz="900" dirty="0">
+                <a:latin typeface="Consolas" panose="020B0609020204030204" pitchFamily="49" charset="0"/>
+              </a:rPr>
+              <a:t>"</a:t>
+            </a:r>
+          </a:p>
+          <a:p>
+            <a:r>
+              <a:rPr lang="en-GB" sz="900" dirty="0">
+                <a:latin typeface="Consolas" panose="020B0609020204030204" pitchFamily="49" charset="0"/>
+              </a:rPr>
+              <a:t>  ],</a:t>
+            </a:r>
+          </a:p>
+          <a:p>
+            <a:r>
+              <a:rPr lang="en-GB" sz="900" dirty="0">
+                <a:latin typeface="Consolas" panose="020B0609020204030204" pitchFamily="49" charset="0"/>
+              </a:rPr>
+              <a:t>  "</a:t>
+            </a:r>
+            <a:r>
+              <a:rPr lang="en-GB" sz="900" dirty="0" err="1">
+                <a:latin typeface="Consolas" panose="020B0609020204030204" pitchFamily="49" charset="0"/>
+              </a:rPr>
+              <a:t>publishExclude</a:t>
+            </a:r>
+            <a:r>
+              <a:rPr lang="en-GB" sz="900" dirty="0">
+                <a:latin typeface="Consolas" panose="020B0609020204030204" pitchFamily="49" charset="0"/>
+              </a:rPr>
+              <a:t>": [</a:t>
+            </a:r>
+          </a:p>
+          <a:p>
+            <a:r>
+              <a:rPr lang="en-GB" sz="900" dirty="0">
+                <a:latin typeface="Consolas" panose="020B0609020204030204" pitchFamily="49" charset="0"/>
+              </a:rPr>
+              <a:t>    "**.user",</a:t>
+            </a:r>
+          </a:p>
+          <a:p>
+            <a:r>
+              <a:rPr lang="en-GB" sz="900" dirty="0">
+                <a:latin typeface="Consolas" panose="020B0609020204030204" pitchFamily="49" charset="0"/>
+              </a:rPr>
+              <a:t>    "**.</a:t>
+            </a:r>
+            <a:r>
+              <a:rPr lang="en-GB" sz="900" dirty="0" err="1">
+                <a:latin typeface="Consolas" panose="020B0609020204030204" pitchFamily="49" charset="0"/>
+              </a:rPr>
+              <a:t>vspscc</a:t>
+            </a:r>
+            <a:r>
+              <a:rPr lang="en-GB" sz="900" dirty="0">
+                <a:latin typeface="Consolas" panose="020B0609020204030204" pitchFamily="49" charset="0"/>
+              </a:rPr>
+              <a:t>"</a:t>
+            </a:r>
+          </a:p>
+          <a:p>
+            <a:r>
+              <a:rPr lang="en-GB" sz="900" dirty="0">
+                <a:latin typeface="Consolas" panose="020B0609020204030204" pitchFamily="49" charset="0"/>
+              </a:rPr>
+              <a:t>  ],</a:t>
+            </a:r>
+          </a:p>
+          <a:p>
+            <a:r>
+              <a:rPr lang="en-GB" sz="900" dirty="0">
+                <a:latin typeface="Consolas" panose="020B0609020204030204" pitchFamily="49" charset="0"/>
+              </a:rPr>
+              <a:t>  "scripts": {</a:t>
+            </a:r>
+          </a:p>
+          <a:p>
+            <a:r>
+              <a:rPr lang="en-GB" sz="900" dirty="0">
+                <a:latin typeface="Consolas" panose="020B0609020204030204" pitchFamily="49" charset="0"/>
+              </a:rPr>
+              <a:t>    "</a:t>
+            </a:r>
+            <a:r>
+              <a:rPr lang="en-GB" sz="900" dirty="0" err="1">
+                <a:latin typeface="Consolas" panose="020B0609020204030204" pitchFamily="49" charset="0"/>
+              </a:rPr>
+              <a:t>prepublish</a:t>
+            </a:r>
+            <a:r>
+              <a:rPr lang="en-GB" sz="900" dirty="0">
+                <a:latin typeface="Consolas" panose="020B0609020204030204" pitchFamily="49" charset="0"/>
+              </a:rPr>
+              <a:t>": [ "</a:t>
+            </a:r>
+            <a:r>
+              <a:rPr lang="en-GB" sz="900" dirty="0" err="1">
+                <a:latin typeface="Consolas" panose="020B0609020204030204" pitchFamily="49" charset="0"/>
+              </a:rPr>
+              <a:t>npm</a:t>
+            </a:r>
+            <a:r>
+              <a:rPr lang="en-GB" sz="900" dirty="0">
+                <a:latin typeface="Consolas" panose="020B0609020204030204" pitchFamily="49" charset="0"/>
+              </a:rPr>
+              <a:t> install", "bower install", "gulp clean", "gulp min" ]</a:t>
+            </a:r>
+          </a:p>
+          <a:p>
+            <a:r>
+              <a:rPr lang="en-GB" sz="900" dirty="0">
+                <a:latin typeface="Consolas" panose="020B0609020204030204" pitchFamily="49" charset="0"/>
+              </a:rPr>
+              <a:t>  }</a:t>
+            </a:r>
+          </a:p>
+          <a:p>
+            <a:r>
+              <a:rPr lang="en-GB" sz="900" dirty="0">
+                <a:latin typeface="Consolas" panose="020B0609020204030204" pitchFamily="49" charset="0"/>
+              </a:rPr>
+              <a:t>}</a:t>
+            </a:r>
+          </a:p>
+          <a:p>
+            <a:endParaRPr lang="en-GB" sz="1000" dirty="0">
+              <a:latin typeface="Consolas" panose="020B0609020204030204" pitchFamily="49" charset="0"/>
+            </a:endParaRPr>
+          </a:p>
+        </p:txBody>
+      </p:sp>
+    </p:spTree>
+    <p:extLst>
+      <p:ext uri="{BB962C8B-B14F-4D97-AF65-F5344CB8AC3E}">
+        <p14:creationId xmlns:p14="http://schemas.microsoft.com/office/powerpoint/2010/main" val="1217420251"/>
+      </p:ext>
+    </p:extLst>
+  </p:cSld>
+  <p:clrMapOvr>
+    <a:masterClrMapping/>
+  </p:clrMapOvr>
+  <p:timing>
+    <p:tnLst>
+      <p:par>
+        <p:cTn id="1" dur="indefinite" restart="never" nodeType="tmRoot"/>
+      </p:par>
+    </p:tnLst>
+  </p:timing>
+</p:sld>
+</file>
+
+<file path=ppt/slides/slide18.xml><?xml version="1.0" encoding="utf-8"?>
+<p:sld xmlns:a="http://schemas.openxmlformats.org/drawingml/2006/main" xmlns:r="http://schemas.openxmlformats.org/officeDocument/2006/relationships" xmlns:p="http://schemas.openxmlformats.org/presentationml/2006/main">
+  <p:cSld>
+    <p:spTree>
+      <p:nvGrpSpPr>
+        <p:cNvPr id="1" name=""/>
+        <p:cNvGrpSpPr/>
+        <p:nvPr/>
+      </p:nvGrpSpPr>
+      <p:grpSpPr>
+        <a:xfrm>
+          <a:off x="0" y="0"/>
+          <a:ext cx="0" cy="0"/>
+          <a:chOff x="0" y="0"/>
+          <a:chExt cx="0" cy="0"/>
+        </a:xfrm>
+      </p:grpSpPr>
+      <p:sp>
+        <p:nvSpPr>
+          <p:cNvPr id="2" name="Title 1"/>
+          <p:cNvSpPr>
+            <a:spLocks noGrp="1"/>
+          </p:cNvSpPr>
+          <p:nvPr>
+            <p:ph type="title"/>
+          </p:nvPr>
+        </p:nvSpPr>
+        <p:spPr/>
+        <p:txBody>
+          <a:bodyPr/>
+          <a:lstStyle/>
+          <a:p>
+            <a:r>
+              <a:rPr lang="en-GB" dirty="0" smtClean="0"/>
+              <a:t>State of play</a:t>
+            </a:r>
+            <a:endParaRPr lang="en-GB" dirty="0"/>
+          </a:p>
+        </p:txBody>
+      </p:sp>
+      <p:sp>
+        <p:nvSpPr>
+          <p:cNvPr id="3" name="Content Placeholder 2"/>
+          <p:cNvSpPr>
+            <a:spLocks noGrp="1"/>
+          </p:cNvSpPr>
+          <p:nvPr>
+            <p:ph idx="1"/>
+          </p:nvPr>
+        </p:nvSpPr>
+        <p:spPr/>
+        <p:txBody>
+          <a:bodyPr/>
+          <a:lstStyle/>
+          <a:p>
+            <a:r>
+              <a:rPr lang="en-GB" sz="2400" dirty="0" smtClean="0"/>
+              <a:t>Framework is RC2</a:t>
+            </a:r>
+          </a:p>
+          <a:p>
+            <a:pPr lvl="1"/>
+            <a:r>
+              <a:rPr lang="en-GB" sz="2000" dirty="0" smtClean="0"/>
+              <a:t>Tooling is Preview 1 (basically an alpha)</a:t>
+            </a:r>
+          </a:p>
+          <a:p>
+            <a:r>
+              <a:rPr lang="en-GB" sz="2400" dirty="0" smtClean="0"/>
+              <a:t>Will RTM end of June (probably during July)</a:t>
+            </a:r>
+          </a:p>
+          <a:p>
+            <a:pPr lvl="1"/>
+            <a:r>
+              <a:rPr lang="en-GB" sz="2000" dirty="0" smtClean="0"/>
+              <a:t>Tooling will be Preview 2</a:t>
+            </a:r>
+          </a:p>
+          <a:p>
+            <a:endParaRPr lang="en-GB" sz="2200" dirty="0"/>
+          </a:p>
+          <a:p>
+            <a:r>
+              <a:rPr lang="en-GB" sz="2200" dirty="0" smtClean="0"/>
+              <a:t>Tooling will RTM with Visual Studio v15 (… 2017?)</a:t>
+            </a:r>
+          </a:p>
+        </p:txBody>
+      </p:sp>
+    </p:spTree>
+    <p:extLst>
+      <p:ext uri="{BB962C8B-B14F-4D97-AF65-F5344CB8AC3E}">
+        <p14:creationId xmlns:p14="http://schemas.microsoft.com/office/powerpoint/2010/main" val="1196435988"/>
+      </p:ext>
+    </p:extLst>
+  </p:cSld>
+  <p:clrMapOvr>
+    <a:masterClrMapping/>
+  </p:clrMapOvr>
+  <p:timing>
+    <p:tnLst>
+      <p:par>
+        <p:cTn id="1" dur="indefinite" restart="never" nodeType="tmRoot"/>
+      </p:par>
+    </p:tnLst>
+  </p:timing>
+</p:sld>
+</file>
+
+<file path=ppt/slides/slide19.xml><?xml version="1.0" encoding="utf-8"?>
+<p:sld xmlns:a="http://schemas.openxmlformats.org/drawingml/2006/main" xmlns:r="http://schemas.openxmlformats.org/officeDocument/2006/relationships" xmlns:p="http://schemas.openxmlformats.org/presentationml/2006/main">
+  <p:cSld>
+    <p:spTree>
+      <p:nvGrpSpPr>
+        <p:cNvPr id="1" name=""/>
+        <p:cNvGrpSpPr/>
+        <p:nvPr/>
+      </p:nvGrpSpPr>
+      <p:grpSpPr>
+        <a:xfrm>
+          <a:off x="0" y="0"/>
+          <a:ext cx="0" cy="0"/>
+          <a:chOff x="0" y="0"/>
+          <a:chExt cx="0" cy="0"/>
+        </a:xfrm>
+      </p:grpSpPr>
+      <p:sp>
+        <p:nvSpPr>
+          <p:cNvPr id="2" name="Title 1"/>
+          <p:cNvSpPr>
+            <a:spLocks noGrp="1"/>
+          </p:cNvSpPr>
+          <p:nvPr>
+            <p:ph type="title"/>
+          </p:nvPr>
+        </p:nvSpPr>
+        <p:spPr/>
+        <p:txBody>
+          <a:bodyPr/>
+          <a:lstStyle/>
+          <a:p>
+            <a:r>
+              <a:rPr lang="en-GB" dirty="0" smtClean="0"/>
               <a:t>What you’ve learned</a:t>
             </a:r>
             <a:endParaRPr lang="en-GB" dirty="0"/>
@@ -3660,7 +5168,7 @@
           <a:p>
             <a:r>
               <a:rPr lang="en-GB" dirty="0" smtClean="0"/>
-              <a:t>What is ASP.NET 5</a:t>
+              <a:t>What is ASP.NET Core</a:t>
             </a:r>
           </a:p>
           <a:p>
@@ -3686,11 +5194,7 @@
             <a:pPr lvl="1"/>
             <a:r>
               <a:rPr lang="en-GB" dirty="0" smtClean="0"/>
-              <a:t>An ASP.NET </a:t>
-            </a:r>
-            <a:r>
-              <a:rPr lang="en-GB" smtClean="0"/>
-              <a:t>5 application</a:t>
+              <a:t>An ASP.NET Core application</a:t>
             </a:r>
             <a:endParaRPr lang="en-GB" dirty="0"/>
           </a:p>
@@ -3706,10 +5210,210 @@
   <p:clrMapOvr>
     <a:masterClrMapping/>
   </p:clrMapOvr>
+  <p:timing>
+    <p:tnLst>
+      <p:par>
+        <p:cTn id="1" dur="indefinite" restart="never" nodeType="tmRoot"/>
+      </p:par>
+    </p:tnLst>
+  </p:timing>
 </p:sld>
 </file>
 
-<file path=ppt/slides/slide13.xml><?xml version="1.0" encoding="utf-8"?>
+<file path=ppt/slides/slide2.xml><?xml version="1.0" encoding="utf-8"?>
+<p:sld xmlns:a="http://schemas.openxmlformats.org/drawingml/2006/main" xmlns:r="http://schemas.openxmlformats.org/officeDocument/2006/relationships" xmlns:p="http://schemas.openxmlformats.org/presentationml/2006/main">
+  <p:cSld>
+    <p:spTree>
+      <p:nvGrpSpPr>
+        <p:cNvPr id="1" name=""/>
+        <p:cNvGrpSpPr/>
+        <p:nvPr/>
+      </p:nvGrpSpPr>
+      <p:grpSpPr>
+        <a:xfrm>
+          <a:off x="0" y="0"/>
+          <a:ext cx="0" cy="0"/>
+          <a:chOff x="0" y="0"/>
+          <a:chExt cx="0" cy="0"/>
+        </a:xfrm>
+      </p:grpSpPr>
+      <p:sp>
+        <p:nvSpPr>
+          <p:cNvPr id="2" name="Title 1"/>
+          <p:cNvSpPr>
+            <a:spLocks noGrp="1"/>
+          </p:cNvSpPr>
+          <p:nvPr>
+            <p:ph type="ctrTitle"/>
+          </p:nvPr>
+        </p:nvSpPr>
+        <p:spPr>
+          <a:xfrm>
+            <a:off x="755576" y="2516624"/>
+            <a:ext cx="7776864" cy="2595025"/>
+          </a:xfrm>
+        </p:spPr>
+        <p:txBody>
+          <a:bodyPr/>
+          <a:lstStyle/>
+          <a:p>
+            <a:r>
+              <a:rPr lang="en-GB" b="1" dirty="0" smtClean="0"/>
+              <a:t>Meet ASP.NET vNext</a:t>
+            </a:r>
+            <a:endParaRPr lang="en-GB" dirty="0"/>
+          </a:p>
+        </p:txBody>
+      </p:sp>
+      <p:sp>
+        <p:nvSpPr>
+          <p:cNvPr id="3" name="Subtitle 2"/>
+          <p:cNvSpPr>
+            <a:spLocks noGrp="1"/>
+          </p:cNvSpPr>
+          <p:nvPr>
+            <p:ph type="subTitle" idx="1"/>
+          </p:nvPr>
+        </p:nvSpPr>
+        <p:spPr/>
+        <p:txBody>
+          <a:bodyPr>
+            <a:normAutofit lnSpcReduction="10000"/>
+          </a:bodyPr>
+          <a:lstStyle/>
+          <a:p>
+            <a:r>
+              <a:rPr lang="en-GB" dirty="0" smtClean="0"/>
+              <a:t>Simone </a:t>
+            </a:r>
+            <a:r>
+              <a:rPr lang="en-GB" dirty="0" err="1" smtClean="0"/>
+              <a:t>Chiaretta</a:t>
+            </a:r>
+            <a:endParaRPr lang="en-GB" dirty="0"/>
+          </a:p>
+          <a:p>
+            <a:r>
+              <a:rPr lang="en-GB" dirty="0" smtClean="0"/>
+              <a:t>@</a:t>
+            </a:r>
+            <a:r>
+              <a:rPr lang="en-GB" dirty="0" err="1" smtClean="0"/>
+              <a:t>simonech</a:t>
+            </a:r>
+            <a:endParaRPr lang="en-GB" dirty="0" smtClean="0"/>
+          </a:p>
+          <a:p>
+            <a:r>
+              <a:rPr lang="en-GB" dirty="0" smtClean="0"/>
+              <a:t>http://codeclimber.net.nz</a:t>
+            </a:r>
+          </a:p>
+        </p:txBody>
+      </p:sp>
+      <p:pic>
+        <p:nvPicPr>
+          <p:cNvPr id="1039" name="Picture 15" descr="http://www.kirkcosiermusic.com/wp-content/uploads/2015/05/twitter3.png"/>
+          <p:cNvPicPr>
+            <a:picLocks noChangeAspect="1" noChangeArrowheads="1"/>
+          </p:cNvPicPr>
+          <p:nvPr/>
+        </p:nvPicPr>
+        <p:blipFill>
+          <a:blip r:embed="rId2" cstate="print">
+            <a:extLst>
+              <a:ext uri="{28A0092B-C50C-407E-A947-70E740481C1C}">
+                <a14:useLocalDpi xmlns:a14="http://schemas.microsoft.com/office/drawing/2010/main" val="0"/>
+              </a:ext>
+            </a:extLst>
+          </a:blip>
+          <a:srcRect/>
+          <a:stretch>
+            <a:fillRect/>
+          </a:stretch>
+        </p:blipFill>
+        <p:spPr bwMode="auto">
+          <a:xfrm>
+            <a:off x="650776" y="5636654"/>
+            <a:ext cx="320824" cy="240618"/>
+          </a:xfrm>
+          <a:prstGeom prst="rect">
+            <a:avLst/>
+          </a:prstGeom>
+          <a:noFill/>
+          <a:extLst>
+            <a:ext uri="{909E8E84-426E-40DD-AFC4-6F175D3DCCD1}">
+              <a14:hiddenFill xmlns:a14="http://schemas.microsoft.com/office/drawing/2010/main">
+                <a:solidFill>
+                  <a:srgbClr val="FFFFFF"/>
+                </a:solidFill>
+              </a14:hiddenFill>
+            </a:ext>
+          </a:extLst>
+        </p:spPr>
+      </p:pic>
+      <p:pic>
+        <p:nvPicPr>
+          <p:cNvPr id="1043" name="Picture 19" descr="http://i0.wp.com/eventsnorthern.files.wordpress.com/2011/09/blog-icon-200.png"/>
+          <p:cNvPicPr>
+            <a:picLocks noChangeAspect="1" noChangeArrowheads="1"/>
+          </p:cNvPicPr>
+          <p:nvPr/>
+        </p:nvPicPr>
+        <p:blipFill>
+          <a:blip r:embed="rId3" cstate="print">
+            <a:extLst>
+              <a:ext uri="{28A0092B-C50C-407E-A947-70E740481C1C}">
+                <a14:useLocalDpi xmlns:a14="http://schemas.microsoft.com/office/drawing/2010/main" val="0"/>
+              </a:ext>
+            </a:extLst>
+          </a:blip>
+          <a:srcRect/>
+          <a:stretch>
+            <a:fillRect/>
+          </a:stretch>
+        </p:blipFill>
+        <p:spPr bwMode="auto">
+          <a:xfrm>
+            <a:off x="650776" y="5949280"/>
+            <a:ext cx="320824" cy="320824"/>
+          </a:xfrm>
+          <a:prstGeom prst="rect">
+            <a:avLst/>
+          </a:prstGeom>
+          <a:noFill/>
+          <a:extLst>
+            <a:ext uri="{909E8E84-426E-40DD-AFC4-6F175D3DCCD1}">
+              <a14:hiddenFill xmlns:a14="http://schemas.microsoft.com/office/drawing/2010/main">
+                <a:solidFill>
+                  <a:srgbClr val="FFFFFF"/>
+                </a:solidFill>
+              </a14:hiddenFill>
+            </a:ext>
+          </a:extLst>
+        </p:spPr>
+      </p:pic>
+    </p:spTree>
+    <p:extLst>
+      <p:ext uri="{BB962C8B-B14F-4D97-AF65-F5344CB8AC3E}">
+        <p14:creationId xmlns:p14="http://schemas.microsoft.com/office/powerpoint/2010/main" val="925489719"/>
+      </p:ext>
+    </p:extLst>
+  </p:cSld>
+  <p:clrMapOvr>
+    <a:masterClrMapping/>
+  </p:clrMapOvr>
+  <p:timing>
+    <p:tnLst>
+      <p:par>
+        <p:cTn id="1" dur="indefinite" restart="never" nodeType="tmRoot"/>
+      </p:par>
+    </p:tnLst>
+  </p:timing>
+</p:sld>
+</file>
+
+<file path=ppt/slides/slide20.xml><?xml version="1.0" encoding="utf-8"?>
 <p:sld xmlns:a="http://schemas.openxmlformats.org/drawingml/2006/main" xmlns:r="http://schemas.openxmlformats.org/officeDocument/2006/relationships" xmlns:p="http://schemas.openxmlformats.org/presentationml/2006/main">
   <p:cSld>
     <p:spTree>
@@ -3917,7 +5621,7 @@
 </p:sld>
 </file>
 
-<file path=ppt/slides/slide2.xml><?xml version="1.0" encoding="utf-8"?>
+<file path=ppt/slides/slide3.xml><?xml version="1.0" encoding="utf-8"?>
 <p:sld xmlns:a="http://schemas.openxmlformats.org/drawingml/2006/main" xmlns:r="http://schemas.openxmlformats.org/officeDocument/2006/relationships" xmlns:p="http://schemas.openxmlformats.org/presentationml/2006/main">
   <p:cSld>
     <p:spTree>
@@ -3941,6 +5645,920 @@
             <a:spLocks noGrp="1"/>
           </p:cNvSpPr>
           <p:nvPr>
+            <p:ph type="ctrTitle"/>
+          </p:nvPr>
+        </p:nvSpPr>
+        <p:spPr>
+          <a:xfrm>
+            <a:off x="755576" y="2516624"/>
+            <a:ext cx="7776864" cy="2595025"/>
+          </a:xfrm>
+        </p:spPr>
+        <p:txBody>
+          <a:bodyPr/>
+          <a:lstStyle/>
+          <a:p>
+            <a:r>
+              <a:rPr lang="en-GB" b="1" dirty="0" smtClean="0"/>
+              <a:t>Meet </a:t>
+            </a:r>
+            <a:r>
+              <a:rPr lang="en-GB" b="1" dirty="0" smtClean="0"/>
+              <a:t>ASP.NET </a:t>
+            </a:r>
+            <a:r>
+              <a:rPr lang="en-GB" b="1" dirty="0" smtClean="0"/>
+              <a:t>5</a:t>
+            </a:r>
+            <a:endParaRPr lang="en-GB" dirty="0"/>
+          </a:p>
+        </p:txBody>
+      </p:sp>
+      <p:sp>
+        <p:nvSpPr>
+          <p:cNvPr id="3" name="Subtitle 2"/>
+          <p:cNvSpPr>
+            <a:spLocks noGrp="1"/>
+          </p:cNvSpPr>
+          <p:nvPr>
+            <p:ph type="subTitle" idx="1"/>
+          </p:nvPr>
+        </p:nvSpPr>
+        <p:spPr/>
+        <p:txBody>
+          <a:bodyPr>
+            <a:normAutofit lnSpcReduction="10000"/>
+          </a:bodyPr>
+          <a:lstStyle/>
+          <a:p>
+            <a:r>
+              <a:rPr lang="en-GB" dirty="0" smtClean="0"/>
+              <a:t>Simone </a:t>
+            </a:r>
+            <a:r>
+              <a:rPr lang="en-GB" dirty="0" err="1" smtClean="0"/>
+              <a:t>Chiaretta</a:t>
+            </a:r>
+            <a:endParaRPr lang="en-GB" dirty="0"/>
+          </a:p>
+          <a:p>
+            <a:r>
+              <a:rPr lang="en-GB" dirty="0" smtClean="0"/>
+              <a:t>@</a:t>
+            </a:r>
+            <a:r>
+              <a:rPr lang="en-GB" dirty="0" err="1" smtClean="0"/>
+              <a:t>simonech</a:t>
+            </a:r>
+            <a:endParaRPr lang="en-GB" dirty="0" smtClean="0"/>
+          </a:p>
+          <a:p>
+            <a:r>
+              <a:rPr lang="en-GB" dirty="0" smtClean="0"/>
+              <a:t>http://codeclimber.net.nz</a:t>
+            </a:r>
+          </a:p>
+        </p:txBody>
+      </p:sp>
+      <p:pic>
+        <p:nvPicPr>
+          <p:cNvPr id="1039" name="Picture 15" descr="http://www.kirkcosiermusic.com/wp-content/uploads/2015/05/twitter3.png"/>
+          <p:cNvPicPr>
+            <a:picLocks noChangeAspect="1" noChangeArrowheads="1"/>
+          </p:cNvPicPr>
+          <p:nvPr/>
+        </p:nvPicPr>
+        <p:blipFill>
+          <a:blip r:embed="rId2" cstate="print">
+            <a:extLst>
+              <a:ext uri="{28A0092B-C50C-407E-A947-70E740481C1C}">
+                <a14:useLocalDpi xmlns:a14="http://schemas.microsoft.com/office/drawing/2010/main" val="0"/>
+              </a:ext>
+            </a:extLst>
+          </a:blip>
+          <a:srcRect/>
+          <a:stretch>
+            <a:fillRect/>
+          </a:stretch>
+        </p:blipFill>
+        <p:spPr bwMode="auto">
+          <a:xfrm>
+            <a:off x="650776" y="5636654"/>
+            <a:ext cx="320824" cy="240618"/>
+          </a:xfrm>
+          <a:prstGeom prst="rect">
+            <a:avLst/>
+          </a:prstGeom>
+          <a:noFill/>
+          <a:extLst>
+            <a:ext uri="{909E8E84-426E-40DD-AFC4-6F175D3DCCD1}">
+              <a14:hiddenFill xmlns:a14="http://schemas.microsoft.com/office/drawing/2010/main">
+                <a:solidFill>
+                  <a:srgbClr val="FFFFFF"/>
+                </a:solidFill>
+              </a14:hiddenFill>
+            </a:ext>
+          </a:extLst>
+        </p:spPr>
+      </p:pic>
+      <p:pic>
+        <p:nvPicPr>
+          <p:cNvPr id="1043" name="Picture 19" descr="http://i0.wp.com/eventsnorthern.files.wordpress.com/2011/09/blog-icon-200.png"/>
+          <p:cNvPicPr>
+            <a:picLocks noChangeAspect="1" noChangeArrowheads="1"/>
+          </p:cNvPicPr>
+          <p:nvPr/>
+        </p:nvPicPr>
+        <p:blipFill>
+          <a:blip r:embed="rId3" cstate="print">
+            <a:extLst>
+              <a:ext uri="{28A0092B-C50C-407E-A947-70E740481C1C}">
+                <a14:useLocalDpi xmlns:a14="http://schemas.microsoft.com/office/drawing/2010/main" val="0"/>
+              </a:ext>
+            </a:extLst>
+          </a:blip>
+          <a:srcRect/>
+          <a:stretch>
+            <a:fillRect/>
+          </a:stretch>
+        </p:blipFill>
+        <p:spPr bwMode="auto">
+          <a:xfrm>
+            <a:off x="650776" y="5949280"/>
+            <a:ext cx="320824" cy="320824"/>
+          </a:xfrm>
+          <a:prstGeom prst="rect">
+            <a:avLst/>
+          </a:prstGeom>
+          <a:noFill/>
+          <a:extLst>
+            <a:ext uri="{909E8E84-426E-40DD-AFC4-6F175D3DCCD1}">
+              <a14:hiddenFill xmlns:a14="http://schemas.microsoft.com/office/drawing/2010/main">
+                <a:solidFill>
+                  <a:srgbClr val="FFFFFF"/>
+                </a:solidFill>
+              </a14:hiddenFill>
+            </a:ext>
+          </a:extLst>
+        </p:spPr>
+      </p:pic>
+    </p:spTree>
+    <p:extLst>
+      <p:ext uri="{BB962C8B-B14F-4D97-AF65-F5344CB8AC3E}">
+        <p14:creationId xmlns:p14="http://schemas.microsoft.com/office/powerpoint/2010/main" val="3208342819"/>
+      </p:ext>
+    </p:extLst>
+  </p:cSld>
+  <p:clrMapOvr>
+    <a:masterClrMapping/>
+  </p:clrMapOvr>
+  <p:timing>
+    <p:tnLst>
+      <p:par>
+        <p:cTn id="1" dur="indefinite" restart="never" nodeType="tmRoot"/>
+      </p:par>
+    </p:tnLst>
+  </p:timing>
+</p:sld>
+</file>
+
+<file path=ppt/slides/slide4.xml><?xml version="1.0" encoding="utf-8"?>
+<p:sld xmlns:a="http://schemas.openxmlformats.org/drawingml/2006/main" xmlns:r="http://schemas.openxmlformats.org/officeDocument/2006/relationships" xmlns:p="http://schemas.openxmlformats.org/presentationml/2006/main">
+  <p:cSld>
+    <p:spTree>
+      <p:nvGrpSpPr>
+        <p:cNvPr id="1" name=""/>
+        <p:cNvGrpSpPr/>
+        <p:nvPr/>
+      </p:nvGrpSpPr>
+      <p:grpSpPr>
+        <a:xfrm>
+          <a:off x="0" y="0"/>
+          <a:ext cx="0" cy="0"/>
+          <a:chOff x="0" y="0"/>
+          <a:chExt cx="0" cy="0"/>
+        </a:xfrm>
+      </p:grpSpPr>
+      <p:sp>
+        <p:nvSpPr>
+          <p:cNvPr id="2" name="Title 1"/>
+          <p:cNvSpPr>
+            <a:spLocks noGrp="1"/>
+          </p:cNvSpPr>
+          <p:nvPr>
+            <p:ph type="ctrTitle"/>
+          </p:nvPr>
+        </p:nvSpPr>
+        <p:spPr>
+          <a:xfrm>
+            <a:off x="755576" y="2516624"/>
+            <a:ext cx="7776864" cy="2595025"/>
+          </a:xfrm>
+        </p:spPr>
+        <p:txBody>
+          <a:bodyPr/>
+          <a:lstStyle/>
+          <a:p>
+            <a:r>
+              <a:rPr lang="en-GB" b="1" dirty="0" smtClean="0"/>
+              <a:t>Meet ASP.NET Core</a:t>
+            </a:r>
+            <a:endParaRPr lang="en-GB" dirty="0"/>
+          </a:p>
+        </p:txBody>
+      </p:sp>
+      <p:sp>
+        <p:nvSpPr>
+          <p:cNvPr id="3" name="Subtitle 2"/>
+          <p:cNvSpPr>
+            <a:spLocks noGrp="1"/>
+          </p:cNvSpPr>
+          <p:nvPr>
+            <p:ph type="subTitle" idx="1"/>
+          </p:nvPr>
+        </p:nvSpPr>
+        <p:spPr/>
+        <p:txBody>
+          <a:bodyPr>
+            <a:normAutofit lnSpcReduction="10000"/>
+          </a:bodyPr>
+          <a:lstStyle/>
+          <a:p>
+            <a:r>
+              <a:rPr lang="en-GB" dirty="0" smtClean="0"/>
+              <a:t>Simone </a:t>
+            </a:r>
+            <a:r>
+              <a:rPr lang="en-GB" dirty="0" err="1" smtClean="0"/>
+              <a:t>Chiaretta</a:t>
+            </a:r>
+            <a:endParaRPr lang="en-GB" dirty="0"/>
+          </a:p>
+          <a:p>
+            <a:r>
+              <a:rPr lang="en-GB" dirty="0" smtClean="0"/>
+              <a:t>@</a:t>
+            </a:r>
+            <a:r>
+              <a:rPr lang="en-GB" dirty="0" err="1" smtClean="0"/>
+              <a:t>simonech</a:t>
+            </a:r>
+            <a:endParaRPr lang="en-GB" dirty="0" smtClean="0"/>
+          </a:p>
+          <a:p>
+            <a:r>
+              <a:rPr lang="en-GB" dirty="0" smtClean="0"/>
+              <a:t>http://codeclimber.net.nz</a:t>
+            </a:r>
+          </a:p>
+        </p:txBody>
+      </p:sp>
+      <p:pic>
+        <p:nvPicPr>
+          <p:cNvPr id="1039" name="Picture 15" descr="http://www.kirkcosiermusic.com/wp-content/uploads/2015/05/twitter3.png"/>
+          <p:cNvPicPr>
+            <a:picLocks noChangeAspect="1" noChangeArrowheads="1"/>
+          </p:cNvPicPr>
+          <p:nvPr/>
+        </p:nvPicPr>
+        <p:blipFill>
+          <a:blip r:embed="rId2" cstate="print">
+            <a:extLst>
+              <a:ext uri="{28A0092B-C50C-407E-A947-70E740481C1C}">
+                <a14:useLocalDpi xmlns:a14="http://schemas.microsoft.com/office/drawing/2010/main" val="0"/>
+              </a:ext>
+            </a:extLst>
+          </a:blip>
+          <a:srcRect/>
+          <a:stretch>
+            <a:fillRect/>
+          </a:stretch>
+        </p:blipFill>
+        <p:spPr bwMode="auto">
+          <a:xfrm>
+            <a:off x="650776" y="5636654"/>
+            <a:ext cx="320824" cy="240618"/>
+          </a:xfrm>
+          <a:prstGeom prst="rect">
+            <a:avLst/>
+          </a:prstGeom>
+          <a:noFill/>
+          <a:extLst>
+            <a:ext uri="{909E8E84-426E-40DD-AFC4-6F175D3DCCD1}">
+              <a14:hiddenFill xmlns:a14="http://schemas.microsoft.com/office/drawing/2010/main">
+                <a:solidFill>
+                  <a:srgbClr val="FFFFFF"/>
+                </a:solidFill>
+              </a14:hiddenFill>
+            </a:ext>
+          </a:extLst>
+        </p:spPr>
+      </p:pic>
+      <p:pic>
+        <p:nvPicPr>
+          <p:cNvPr id="1043" name="Picture 19" descr="http://i0.wp.com/eventsnorthern.files.wordpress.com/2011/09/blog-icon-200.png"/>
+          <p:cNvPicPr>
+            <a:picLocks noChangeAspect="1" noChangeArrowheads="1"/>
+          </p:cNvPicPr>
+          <p:nvPr/>
+        </p:nvPicPr>
+        <p:blipFill>
+          <a:blip r:embed="rId3" cstate="print">
+            <a:extLst>
+              <a:ext uri="{28A0092B-C50C-407E-A947-70E740481C1C}">
+                <a14:useLocalDpi xmlns:a14="http://schemas.microsoft.com/office/drawing/2010/main" val="0"/>
+              </a:ext>
+            </a:extLst>
+          </a:blip>
+          <a:srcRect/>
+          <a:stretch>
+            <a:fillRect/>
+          </a:stretch>
+        </p:blipFill>
+        <p:spPr bwMode="auto">
+          <a:xfrm>
+            <a:off x="650776" y="5949280"/>
+            <a:ext cx="320824" cy="320824"/>
+          </a:xfrm>
+          <a:prstGeom prst="rect">
+            <a:avLst/>
+          </a:prstGeom>
+          <a:noFill/>
+          <a:extLst>
+            <a:ext uri="{909E8E84-426E-40DD-AFC4-6F175D3DCCD1}">
+              <a14:hiddenFill xmlns:a14="http://schemas.microsoft.com/office/drawing/2010/main">
+                <a:solidFill>
+                  <a:srgbClr val="FFFFFF"/>
+                </a:solidFill>
+              </a14:hiddenFill>
+            </a:ext>
+          </a:extLst>
+        </p:spPr>
+      </p:pic>
+      <p:pic>
+        <p:nvPicPr>
+          <p:cNvPr id="3076" name="Picture 4" descr="http://www.ubelly.com/wp-content/uploads/2010/12/umbraco_logo1.png"/>
+          <p:cNvPicPr>
+            <a:picLocks noChangeAspect="1" noChangeArrowheads="1"/>
+          </p:cNvPicPr>
+          <p:nvPr/>
+        </p:nvPicPr>
+        <p:blipFill>
+          <a:blip r:embed="rId4">
+            <a:extLst>
+              <a:ext uri="{28A0092B-C50C-407E-A947-70E740481C1C}">
+                <a14:useLocalDpi xmlns:a14="http://schemas.microsoft.com/office/drawing/2010/main" val="0"/>
+              </a:ext>
+            </a:extLst>
+          </a:blip>
+          <a:srcRect/>
+          <a:stretch>
+            <a:fillRect/>
+          </a:stretch>
+        </p:blipFill>
+        <p:spPr bwMode="auto">
+          <a:xfrm rot="20114344">
+            <a:off x="-301724" y="-148063"/>
+            <a:ext cx="1905000" cy="1905000"/>
+          </a:xfrm>
+          <a:prstGeom prst="rect">
+            <a:avLst/>
+          </a:prstGeom>
+          <a:noFill/>
+          <a:extLst>
+            <a:ext uri="{909E8E84-426E-40DD-AFC4-6F175D3DCCD1}">
+              <a14:hiddenFill xmlns:a14="http://schemas.microsoft.com/office/drawing/2010/main">
+                <a:solidFill>
+                  <a:srgbClr val="FFFFFF"/>
+                </a:solidFill>
+              </a14:hiddenFill>
+            </a:ext>
+          </a:extLst>
+        </p:spPr>
+      </p:pic>
+    </p:spTree>
+    <p:extLst>
+      <p:ext uri="{BB962C8B-B14F-4D97-AF65-F5344CB8AC3E}">
+        <p14:creationId xmlns:p14="http://schemas.microsoft.com/office/powerpoint/2010/main" val="539964588"/>
+      </p:ext>
+    </p:extLst>
+  </p:cSld>
+  <p:clrMapOvr>
+    <a:masterClrMapping/>
+  </p:clrMapOvr>
+  <p:timing>
+    <p:tnLst>
+      <p:par>
+        <p:cTn id="1" dur="indefinite" restart="never" nodeType="tmRoot"/>
+      </p:par>
+    </p:tnLst>
+  </p:timing>
+</p:sld>
+</file>
+
+<file path=ppt/slides/slide5.xml><?xml version="1.0" encoding="utf-8"?>
+<p:sld xmlns:a="http://schemas.openxmlformats.org/drawingml/2006/main" xmlns:r="http://schemas.openxmlformats.org/officeDocument/2006/relationships" xmlns:p="http://schemas.openxmlformats.org/presentationml/2006/main">
+  <p:cSld>
+    <p:spTree>
+      <p:nvGrpSpPr>
+        <p:cNvPr id="1" name=""/>
+        <p:cNvGrpSpPr/>
+        <p:nvPr/>
+      </p:nvGrpSpPr>
+      <p:grpSpPr>
+        <a:xfrm>
+          <a:off x="0" y="0"/>
+          <a:ext cx="0" cy="0"/>
+          <a:chOff x="0" y="0"/>
+          <a:chExt cx="0" cy="0"/>
+        </a:xfrm>
+      </p:grpSpPr>
+      <p:sp>
+        <p:nvSpPr>
+          <p:cNvPr id="2" name="Title 1"/>
+          <p:cNvSpPr>
+            <a:spLocks noGrp="1"/>
+          </p:cNvSpPr>
+          <p:nvPr>
+            <p:ph type="title"/>
+          </p:nvPr>
+        </p:nvSpPr>
+        <p:spPr/>
+        <p:txBody>
+          <a:bodyPr/>
+          <a:lstStyle/>
+          <a:p>
+            <a:r>
+              <a:rPr lang="en-GB" dirty="0" smtClean="0"/>
+              <a:t>Simone Chiaretta</a:t>
+            </a:r>
+            <a:endParaRPr lang="en-GB" dirty="0"/>
+          </a:p>
+        </p:txBody>
+      </p:sp>
+      <p:sp>
+        <p:nvSpPr>
+          <p:cNvPr id="3" name="Content Placeholder 2"/>
+          <p:cNvSpPr>
+            <a:spLocks noGrp="1"/>
+          </p:cNvSpPr>
+          <p:nvPr>
+            <p:ph idx="1"/>
+          </p:nvPr>
+        </p:nvSpPr>
+        <p:spPr/>
+        <p:txBody>
+          <a:bodyPr>
+            <a:normAutofit/>
+          </a:bodyPr>
+          <a:lstStyle/>
+          <a:p>
+            <a:endParaRPr lang="en-GB" dirty="0" smtClean="0"/>
+          </a:p>
+          <a:p>
+            <a:r>
+              <a:rPr lang="en-GB" dirty="0" err="1" smtClean="0"/>
+              <a:t>Umbracian</a:t>
+            </a:r>
+            <a:r>
+              <a:rPr lang="en-GB" dirty="0" smtClean="0"/>
+              <a:t> since 2010</a:t>
+            </a:r>
+          </a:p>
+          <a:p>
+            <a:r>
+              <a:rPr lang="en-GB" dirty="0" smtClean="0"/>
+              <a:t>Web Developer since 1996</a:t>
+            </a:r>
+          </a:p>
+          <a:p>
+            <a:r>
+              <a:rPr lang="en-GB" dirty="0" smtClean="0"/>
+              <a:t>Beginner Triathlete</a:t>
+            </a:r>
+          </a:p>
+          <a:p>
+            <a:endParaRPr lang="en-GB" dirty="0"/>
+          </a:p>
+          <a:p>
+            <a:pPr marL="45720" indent="0">
+              <a:buNone/>
+            </a:pPr>
+            <a:endParaRPr lang="en-GB" dirty="0" smtClean="0"/>
+          </a:p>
+          <a:p>
+            <a:pPr marL="45720" indent="0">
+              <a:buNone/>
+            </a:pPr>
+            <a:r>
+              <a:rPr lang="en-GB" sz="3200" dirty="0" smtClean="0"/>
+              <a:t>http://codeclimber.net.nz</a:t>
+            </a:r>
+            <a:endParaRPr lang="en-GB" sz="3200" dirty="0"/>
+          </a:p>
+        </p:txBody>
+      </p:sp>
+      <p:pic>
+        <p:nvPicPr>
+          <p:cNvPr id="4" name="Picture 2" descr="http://t1.gstatic.com/images?q=tbn:ANd9GcRhc1RRNev3jYJBR7qCl0DrteptDsJtTC59rFRdqW3RZ7qVe6tr"/>
+          <p:cNvPicPr>
+            <a:picLocks noChangeAspect="1" noChangeArrowheads="1"/>
+          </p:cNvPicPr>
+          <p:nvPr/>
+        </p:nvPicPr>
+        <p:blipFill>
+          <a:blip r:embed="rId2" cstate="print">
+            <a:extLst>
+              <a:ext uri="{28A0092B-C50C-407E-A947-70E740481C1C}">
+                <a14:useLocalDpi xmlns:a14="http://schemas.microsoft.com/office/drawing/2010/main" val="0"/>
+              </a:ext>
+            </a:extLst>
+          </a:blip>
+          <a:srcRect/>
+          <a:stretch>
+            <a:fillRect/>
+          </a:stretch>
+        </p:blipFill>
+        <p:spPr bwMode="auto">
+          <a:xfrm>
+            <a:off x="5724128" y="1700808"/>
+            <a:ext cx="2547609" cy="3188940"/>
+          </a:xfrm>
+          <a:prstGeom prst="rect">
+            <a:avLst/>
+          </a:prstGeom>
+          <a:noFill/>
+          <a:extLst>
+            <a:ext uri="{909E8E84-426E-40DD-AFC4-6F175D3DCCD1}">
+              <a14:hiddenFill xmlns:a14="http://schemas.microsoft.com/office/drawing/2010/main">
+                <a:solidFill>
+                  <a:srgbClr val="FFFFFF"/>
+                </a:solidFill>
+              </a14:hiddenFill>
+            </a:ext>
+          </a:extLst>
+        </p:spPr>
+      </p:pic>
+    </p:spTree>
+    <p:extLst>
+      <p:ext uri="{BB962C8B-B14F-4D97-AF65-F5344CB8AC3E}">
+        <p14:creationId xmlns:p14="http://schemas.microsoft.com/office/powerpoint/2010/main" val="4097466486"/>
+      </p:ext>
+    </p:extLst>
+  </p:cSld>
+  <p:clrMapOvr>
+    <a:masterClrMapping/>
+  </p:clrMapOvr>
+  <p:timing>
+    <p:tnLst>
+      <p:par>
+        <p:cTn id="1" dur="indefinite" restart="never" nodeType="tmRoot"/>
+      </p:par>
+    </p:tnLst>
+  </p:timing>
+</p:sld>
+</file>
+
+<file path=ppt/slides/slide6.xml><?xml version="1.0" encoding="utf-8"?>
+<p:sld xmlns:a="http://schemas.openxmlformats.org/drawingml/2006/main" xmlns:r="http://schemas.openxmlformats.org/officeDocument/2006/relationships" xmlns:p="http://schemas.openxmlformats.org/presentationml/2006/main">
+  <p:cSld>
+    <p:spTree>
+      <p:nvGrpSpPr>
+        <p:cNvPr id="1" name=""/>
+        <p:cNvGrpSpPr/>
+        <p:nvPr/>
+      </p:nvGrpSpPr>
+      <p:grpSpPr>
+        <a:xfrm>
+          <a:off x="0" y="0"/>
+          <a:ext cx="0" cy="0"/>
+          <a:chOff x="0" y="0"/>
+          <a:chExt cx="0" cy="0"/>
+        </a:xfrm>
+      </p:grpSpPr>
+      <p:sp>
+        <p:nvSpPr>
+          <p:cNvPr id="2" name="Title 1"/>
+          <p:cNvSpPr>
+            <a:spLocks noGrp="1"/>
+          </p:cNvSpPr>
+          <p:nvPr>
+            <p:ph type="title"/>
+          </p:nvPr>
+        </p:nvSpPr>
+        <p:spPr/>
+        <p:txBody>
+          <a:bodyPr>
+            <a:normAutofit fontScale="90000"/>
+          </a:bodyPr>
+          <a:lstStyle/>
+          <a:p>
+            <a:r>
+              <a:rPr lang="en-GB" b="1" dirty="0"/>
+              <a:t>Front-end Development with ASP.NET MVC 6, AngularJS, and </a:t>
+            </a:r>
+            <a:r>
+              <a:rPr lang="en-GB" b="1" dirty="0" smtClean="0"/>
+              <a:t>Bootstrap</a:t>
+            </a:r>
+            <a:endParaRPr lang="en-GB" dirty="0"/>
+          </a:p>
+        </p:txBody>
+      </p:sp>
+      <p:sp>
+        <p:nvSpPr>
+          <p:cNvPr id="3" name="Content Placeholder 2"/>
+          <p:cNvSpPr>
+            <a:spLocks noGrp="1"/>
+          </p:cNvSpPr>
+          <p:nvPr>
+            <p:ph idx="1"/>
+          </p:nvPr>
+        </p:nvSpPr>
+        <p:spPr/>
+        <p:txBody>
+          <a:bodyPr>
+            <a:normAutofit/>
+          </a:bodyPr>
+          <a:lstStyle/>
+          <a:p>
+            <a:endParaRPr lang="en-GB" dirty="0" smtClean="0"/>
+          </a:p>
+          <a:p>
+            <a:endParaRPr lang="en-GB" dirty="0"/>
+          </a:p>
+          <a:p>
+            <a:endParaRPr lang="en-GB" dirty="0" smtClean="0"/>
+          </a:p>
+          <a:p>
+            <a:endParaRPr lang="en-GB" dirty="0"/>
+          </a:p>
+          <a:p>
+            <a:endParaRPr lang="en-GB" dirty="0" smtClean="0"/>
+          </a:p>
+          <a:p>
+            <a:pPr marL="45720" indent="0">
+              <a:buNone/>
+            </a:pPr>
+            <a:endParaRPr lang="en-GB" dirty="0"/>
+          </a:p>
+          <a:p>
+            <a:pPr marL="45720" indent="0">
+              <a:buNone/>
+            </a:pPr>
+            <a:endParaRPr lang="en-GB" dirty="0" smtClean="0"/>
+          </a:p>
+        </p:txBody>
+      </p:sp>
+      <p:pic>
+        <p:nvPicPr>
+          <p:cNvPr id="2050" name="Picture 2" descr="https://images-na.ssl-images-amazon.com/images/I/51isHYtrFpL._SX396_BO1,204,203,200_.jpg"/>
+          <p:cNvPicPr>
+            <a:picLocks noChangeAspect="1" noChangeArrowheads="1"/>
+          </p:cNvPicPr>
+          <p:nvPr/>
+        </p:nvPicPr>
+        <p:blipFill>
+          <a:blip r:embed="rId2">
+            <a:extLst>
+              <a:ext uri="{28A0092B-C50C-407E-A947-70E740481C1C}">
+                <a14:useLocalDpi xmlns:a14="http://schemas.microsoft.com/office/drawing/2010/main" val="0"/>
+              </a:ext>
+            </a:extLst>
+          </a:blip>
+          <a:srcRect/>
+          <a:stretch>
+            <a:fillRect/>
+          </a:stretch>
+        </p:blipFill>
+        <p:spPr bwMode="auto">
+          <a:xfrm>
+            <a:off x="3563888" y="2986872"/>
+            <a:ext cx="2642286" cy="3312816"/>
+          </a:xfrm>
+          <a:prstGeom prst="rect">
+            <a:avLst/>
+          </a:prstGeom>
+          <a:noFill/>
+          <a:extLst>
+            <a:ext uri="{909E8E84-426E-40DD-AFC4-6F175D3DCCD1}">
+              <a14:hiddenFill xmlns:a14="http://schemas.microsoft.com/office/drawing/2010/main">
+                <a:solidFill>
+                  <a:srgbClr val="FFFFFF"/>
+                </a:solidFill>
+              </a14:hiddenFill>
+            </a:ext>
+          </a:extLst>
+        </p:spPr>
+      </p:pic>
+    </p:spTree>
+    <p:extLst>
+      <p:ext uri="{BB962C8B-B14F-4D97-AF65-F5344CB8AC3E}">
+        <p14:creationId xmlns:p14="http://schemas.microsoft.com/office/powerpoint/2010/main" val="467474847"/>
+      </p:ext>
+    </p:extLst>
+  </p:cSld>
+  <p:clrMapOvr>
+    <a:masterClrMapping/>
+  </p:clrMapOvr>
+  <p:timing>
+    <p:tnLst>
+      <p:par>
+        <p:cTn id="1" dur="indefinite" restart="never" nodeType="tmRoot"/>
+      </p:par>
+    </p:tnLst>
+  </p:timing>
+</p:sld>
+</file>
+
+<file path=ppt/slides/slide7.xml><?xml version="1.0" encoding="utf-8"?>
+<p:sld xmlns:a="http://schemas.openxmlformats.org/drawingml/2006/main" xmlns:r="http://schemas.openxmlformats.org/officeDocument/2006/relationships" xmlns:p="http://schemas.openxmlformats.org/presentationml/2006/main">
+  <p:cSld>
+    <p:spTree>
+      <p:nvGrpSpPr>
+        <p:cNvPr id="1" name=""/>
+        <p:cNvGrpSpPr/>
+        <p:nvPr/>
+      </p:nvGrpSpPr>
+      <p:grpSpPr>
+        <a:xfrm>
+          <a:off x="0" y="0"/>
+          <a:ext cx="0" cy="0"/>
+          <a:chOff x="0" y="0"/>
+          <a:chExt cx="0" cy="0"/>
+        </a:xfrm>
+      </p:grpSpPr>
+      <p:sp>
+        <p:nvSpPr>
+          <p:cNvPr id="2" name="Title 1"/>
+          <p:cNvSpPr>
+            <a:spLocks noGrp="1"/>
+          </p:cNvSpPr>
+          <p:nvPr>
+            <p:ph type="title"/>
+          </p:nvPr>
+        </p:nvSpPr>
+        <p:spPr/>
+        <p:txBody>
+          <a:bodyPr>
+            <a:normAutofit fontScale="90000"/>
+          </a:bodyPr>
+          <a:lstStyle/>
+          <a:p>
+            <a:r>
+              <a:rPr lang="en-GB" b="1" dirty="0"/>
+              <a:t>Front-end Development with </a:t>
+            </a:r>
+            <a:r>
+              <a:rPr lang="en-GB" b="1" dirty="0" smtClean="0"/>
+              <a:t>ASP.NET Core 1 MVC </a:t>
+            </a:r>
+            <a:r>
+              <a:rPr lang="en-GB" b="1" strike="sngStrike" dirty="0"/>
+              <a:t>6</a:t>
+            </a:r>
+            <a:r>
+              <a:rPr lang="en-GB" b="1" dirty="0"/>
+              <a:t>, AngularJS, and </a:t>
+            </a:r>
+            <a:r>
+              <a:rPr lang="en-GB" b="1" dirty="0" smtClean="0"/>
+              <a:t>Bootstrap</a:t>
+            </a:r>
+            <a:endParaRPr lang="en-GB" dirty="0"/>
+          </a:p>
+        </p:txBody>
+      </p:sp>
+      <p:sp>
+        <p:nvSpPr>
+          <p:cNvPr id="3" name="Content Placeholder 2"/>
+          <p:cNvSpPr>
+            <a:spLocks noGrp="1"/>
+          </p:cNvSpPr>
+          <p:nvPr>
+            <p:ph idx="1"/>
+          </p:nvPr>
+        </p:nvSpPr>
+        <p:spPr/>
+        <p:txBody>
+          <a:bodyPr>
+            <a:normAutofit/>
+          </a:bodyPr>
+          <a:lstStyle/>
+          <a:p>
+            <a:endParaRPr lang="en-GB" dirty="0" smtClean="0"/>
+          </a:p>
+          <a:p>
+            <a:endParaRPr lang="en-GB" dirty="0"/>
+          </a:p>
+          <a:p>
+            <a:endParaRPr lang="en-GB" dirty="0" smtClean="0"/>
+          </a:p>
+          <a:p>
+            <a:endParaRPr lang="en-GB" dirty="0"/>
+          </a:p>
+          <a:p>
+            <a:endParaRPr lang="en-GB" dirty="0" smtClean="0"/>
+          </a:p>
+          <a:p>
+            <a:pPr marL="45720" indent="0">
+              <a:buNone/>
+            </a:pPr>
+            <a:endParaRPr lang="en-GB" dirty="0"/>
+          </a:p>
+          <a:p>
+            <a:pPr marL="45720" indent="0">
+              <a:buNone/>
+            </a:pPr>
+            <a:endParaRPr lang="en-GB" dirty="0" smtClean="0"/>
+          </a:p>
+        </p:txBody>
+      </p:sp>
+      <p:pic>
+        <p:nvPicPr>
+          <p:cNvPr id="2050" name="Picture 2" descr="https://images-na.ssl-images-amazon.com/images/I/51isHYtrFpL._SX396_BO1,204,203,200_.jpg"/>
+          <p:cNvPicPr>
+            <a:picLocks noChangeAspect="1" noChangeArrowheads="1"/>
+          </p:cNvPicPr>
+          <p:nvPr/>
+        </p:nvPicPr>
+        <p:blipFill>
+          <a:blip r:embed="rId2">
+            <a:extLst>
+              <a:ext uri="{28A0092B-C50C-407E-A947-70E740481C1C}">
+                <a14:useLocalDpi xmlns:a14="http://schemas.microsoft.com/office/drawing/2010/main" val="0"/>
+              </a:ext>
+            </a:extLst>
+          </a:blip>
+          <a:srcRect/>
+          <a:stretch>
+            <a:fillRect/>
+          </a:stretch>
+        </p:blipFill>
+        <p:spPr bwMode="auto">
+          <a:xfrm>
+            <a:off x="3563888" y="2986872"/>
+            <a:ext cx="2642286" cy="3312816"/>
+          </a:xfrm>
+          <a:prstGeom prst="rect">
+            <a:avLst/>
+          </a:prstGeom>
+          <a:noFill/>
+          <a:extLst>
+            <a:ext uri="{909E8E84-426E-40DD-AFC4-6F175D3DCCD1}">
+              <a14:hiddenFill xmlns:a14="http://schemas.microsoft.com/office/drawing/2010/main">
+                <a:solidFill>
+                  <a:srgbClr val="FFFFFF"/>
+                </a:solidFill>
+              </a14:hiddenFill>
+            </a:ext>
+          </a:extLst>
+        </p:spPr>
+      </p:pic>
+    </p:spTree>
+    <p:extLst>
+      <p:ext uri="{BB962C8B-B14F-4D97-AF65-F5344CB8AC3E}">
+        <p14:creationId xmlns:p14="http://schemas.microsoft.com/office/powerpoint/2010/main" val="4025781430"/>
+      </p:ext>
+    </p:extLst>
+  </p:cSld>
+  <p:clrMapOvr>
+    <a:masterClrMapping/>
+  </p:clrMapOvr>
+  <p:timing>
+    <p:tnLst>
+      <p:par>
+        <p:cTn id="1" dur="indefinite" restart="never" nodeType="tmRoot"/>
+      </p:par>
+    </p:tnLst>
+  </p:timing>
+</p:sld>
+</file>
+
+<file path=ppt/slides/slide8.xml><?xml version="1.0" encoding="utf-8"?>
+<p:sld xmlns:a="http://schemas.openxmlformats.org/drawingml/2006/main" xmlns:r="http://schemas.openxmlformats.org/officeDocument/2006/relationships" xmlns:p="http://schemas.openxmlformats.org/presentationml/2006/main">
+  <p:cSld>
+    <p:spTree>
+      <p:nvGrpSpPr>
+        <p:cNvPr id="1" name=""/>
+        <p:cNvGrpSpPr/>
+        <p:nvPr/>
+      </p:nvGrpSpPr>
+      <p:grpSpPr>
+        <a:xfrm>
+          <a:off x="0" y="0"/>
+          <a:ext cx="0" cy="0"/>
+          <a:chOff x="0" y="0"/>
+          <a:chExt cx="0" cy="0"/>
+        </a:xfrm>
+      </p:grpSpPr>
+      <p:sp>
+        <p:nvSpPr>
+          <p:cNvPr id="2" name="Title 1"/>
+          <p:cNvSpPr>
+            <a:spLocks noGrp="1"/>
+          </p:cNvSpPr>
+          <p:nvPr>
             <p:ph type="title"/>
           </p:nvPr>
         </p:nvSpPr>
@@ -3974,29 +6592,45 @@
           <a:p>
             <a:r>
               <a:rPr lang="en-GB" dirty="0" smtClean="0"/>
-              <a:t>What’s ASP.NET </a:t>
+              <a:t>What’s ASP.NET Core</a:t>
+            </a:r>
+          </a:p>
+          <a:p>
+            <a:r>
+              <a:rPr lang="en-GB" dirty="0" smtClean="0"/>
+              <a:t>Getting started with ASP.NET </a:t>
             </a:r>
             <a:r>
               <a:rPr lang="en-GB" dirty="0" smtClean="0"/>
               <a:t>Core</a:t>
             </a:r>
-            <a:endParaRPr lang="en-GB" dirty="0" smtClean="0"/>
-          </a:p>
-          <a:p>
+          </a:p>
+          <a:p>
+            <a:r>
+              <a:rPr lang="en-GB" dirty="0"/>
+              <a:t>Anatomy of an ASP.NET Core </a:t>
+            </a:r>
             <a:r>
               <a:rPr lang="en-GB" dirty="0" smtClean="0"/>
-              <a:t>Getting started with ASP.NET </a:t>
-            </a:r>
+              <a:t>app</a:t>
+            </a:r>
+          </a:p>
+          <a:p>
             <a:r>
               <a:rPr lang="en-GB" dirty="0" smtClean="0"/>
-              <a:t>Core</a:t>
-            </a:r>
-            <a:endParaRPr lang="en-GB" dirty="0" smtClean="0"/>
+              <a:t>Servers</a:t>
+            </a:r>
+          </a:p>
+          <a:p>
+            <a:r>
+              <a:rPr lang="en-GB" dirty="0"/>
+              <a:t>Cross Platform Console Application</a:t>
+            </a:r>
           </a:p>
           <a:p>
             <a:r>
               <a:rPr lang="en-GB" dirty="0" err="1" smtClean="0"/>
-              <a:t>Dotnet</a:t>
+              <a:t>dotnet</a:t>
             </a:r>
             <a:r>
               <a:rPr lang="en-GB" dirty="0" smtClean="0"/>
@@ -4010,25 +6644,6 @@
               <a:t>Project.json</a:t>
             </a:r>
             <a:endParaRPr lang="en-GB" dirty="0" smtClean="0"/>
-          </a:p>
-          <a:p>
-            <a:r>
-              <a:rPr lang="en-GB" dirty="0" smtClean="0"/>
-              <a:t>Cross Platform Console Application</a:t>
-            </a:r>
-          </a:p>
-          <a:p>
-            <a:r>
-              <a:rPr lang="en-GB" dirty="0" smtClean="0"/>
-              <a:t>Anatomy of a web application</a:t>
-            </a:r>
-          </a:p>
-          <a:p>
-            <a:r>
-              <a:rPr lang="en-GB" dirty="0" smtClean="0"/>
-              <a:t>Servers</a:t>
-            </a:r>
-            <a:endParaRPr lang="en-GB" dirty="0"/>
           </a:p>
         </p:txBody>
       </p:sp>
@@ -4052,7 +6667,7 @@
 </p:sld>
 </file>
 
-<file path=ppt/slides/slide3.xml><?xml version="1.0" encoding="utf-8"?>
+<file path=ppt/slides/slide9.xml><?xml version="1.0" encoding="utf-8"?>
 <p:sld xmlns:a="http://schemas.openxmlformats.org/drawingml/2006/main" xmlns:r="http://schemas.openxmlformats.org/officeDocument/2006/relationships" xmlns:p="http://schemas.openxmlformats.org/presentationml/2006/main">
   <p:cSld>
     <p:spTree>
@@ -4086,11 +6701,7 @@
           <a:p>
             <a:r>
               <a:rPr lang="en-GB" dirty="0" smtClean="0"/>
-              <a:t>What’s ASP.NET </a:t>
-            </a:r>
-            <a:r>
-              <a:rPr lang="en-GB" dirty="0" smtClean="0"/>
-              <a:t>Core</a:t>
+              <a:t>What’s ASP.NET Core</a:t>
             </a:r>
             <a:endParaRPr lang="en-GB" dirty="0"/>
           </a:p>
@@ -4419,11 +7030,7 @@
             <a:pPr algn="ctr"/>
             <a:r>
               <a:rPr lang="en-GB" dirty="0" smtClean="0"/>
-              <a:t>ASP.NET </a:t>
-            </a:r>
-            <a:r>
-              <a:rPr lang="en-GB" dirty="0" smtClean="0"/>
-              <a:t>Core</a:t>
+              <a:t>ASP.NET Core</a:t>
             </a:r>
             <a:endParaRPr lang="en-GB" dirty="0"/>
           </a:p>
@@ -4565,11 +7172,11 @@
             <a:pPr algn="ctr"/>
             <a:r>
               <a:rPr lang="en-GB" dirty="0" smtClean="0"/>
-              <a:t>ASP.NET MVC </a:t>
+              <a:t>ASP.NET </a:t>
             </a:r>
             <a:r>
               <a:rPr lang="en-GB" dirty="0" smtClean="0"/>
-              <a:t>Core</a:t>
+              <a:t>Core MVC</a:t>
             </a:r>
             <a:endParaRPr lang="en-GB" dirty="0"/>
           </a:p>
@@ -4762,1249 +7369,6 @@
     <p:bldLst>
       <p:bldP spid="17" grpId="0" animBg="1"/>
     </p:bldLst>
-  </p:timing>
-</p:sld>
-</file>
-
-<file path=ppt/slides/slide4.xml><?xml version="1.0" encoding="utf-8"?>
-<p:sld xmlns:a="http://schemas.openxmlformats.org/drawingml/2006/main" xmlns:r="http://schemas.openxmlformats.org/officeDocument/2006/relationships" xmlns:p="http://schemas.openxmlformats.org/presentationml/2006/main">
-  <p:cSld>
-    <p:spTree>
-      <p:nvGrpSpPr>
-        <p:cNvPr id="1" name=""/>
-        <p:cNvGrpSpPr/>
-        <p:nvPr/>
-      </p:nvGrpSpPr>
-      <p:grpSpPr>
-        <a:xfrm>
-          <a:off x="0" y="0"/>
-          <a:ext cx="0" cy="0"/>
-          <a:chOff x="0" y="0"/>
-          <a:chExt cx="0" cy="0"/>
-        </a:xfrm>
-      </p:grpSpPr>
-      <p:sp>
-        <p:nvSpPr>
-          <p:cNvPr id="2" name="Title 1"/>
-          <p:cNvSpPr>
-            <a:spLocks noGrp="1"/>
-          </p:cNvSpPr>
-          <p:nvPr>
-            <p:ph type="title"/>
-          </p:nvPr>
-        </p:nvSpPr>
-        <p:spPr/>
-        <p:txBody>
-          <a:bodyPr/>
-          <a:lstStyle/>
-          <a:p>
-            <a:r>
-              <a:rPr lang="en-GB" dirty="0" smtClean="0"/>
-              <a:t>OWIN Succinctly</a:t>
-            </a:r>
-            <a:endParaRPr lang="en-GB" dirty="0"/>
-          </a:p>
-        </p:txBody>
-      </p:sp>
-      <p:sp>
-        <p:nvSpPr>
-          <p:cNvPr id="3" name="Content Placeholder 2"/>
-          <p:cNvSpPr>
-            <a:spLocks noGrp="1"/>
-          </p:cNvSpPr>
-          <p:nvPr>
-            <p:ph idx="1"/>
-          </p:nvPr>
-        </p:nvSpPr>
-        <p:spPr/>
-        <p:txBody>
-          <a:bodyPr>
-            <a:normAutofit/>
-          </a:bodyPr>
-          <a:lstStyle/>
-          <a:p>
-            <a:endParaRPr lang="en-GB" dirty="0" smtClean="0"/>
-          </a:p>
-          <a:p>
-            <a:endParaRPr lang="en-GB" dirty="0"/>
-          </a:p>
-          <a:p>
-            <a:endParaRPr lang="en-GB" dirty="0" smtClean="0"/>
-          </a:p>
-          <a:p>
-            <a:endParaRPr lang="en-GB" dirty="0"/>
-          </a:p>
-          <a:p>
-            <a:endParaRPr lang="en-GB" dirty="0" smtClean="0"/>
-          </a:p>
-          <a:p>
-            <a:pPr marL="45720" indent="0">
-              <a:buNone/>
-            </a:pPr>
-            <a:endParaRPr lang="en-GB" dirty="0"/>
-          </a:p>
-          <a:p>
-            <a:pPr marL="45720" indent="0">
-              <a:buNone/>
-            </a:pPr>
-            <a:endParaRPr lang="en-GB" dirty="0" smtClean="0"/>
-          </a:p>
-          <a:p>
-            <a:pPr marL="45720" indent="0">
-              <a:buNone/>
-            </a:pPr>
-            <a:r>
-              <a:rPr lang="en-GB" sz="1800" dirty="0" smtClean="0"/>
-              <a:t>https</a:t>
-            </a:r>
-            <a:r>
-              <a:rPr lang="en-GB" sz="1800" dirty="0"/>
-              <a:t>://www.syncfusion.com/resources/techportal/details/ebooks/owin</a:t>
-            </a:r>
-          </a:p>
-        </p:txBody>
-      </p:sp>
-      <p:pic>
-        <p:nvPicPr>
-          <p:cNvPr id="1026" name="Picture 2" descr="https://d2g29cya9iq7ip.cloudfront.net/content/images/downloads/ebooks/owin_Succinctly.png?v=29072015044235"/>
-          <p:cNvPicPr>
-            <a:picLocks noChangeAspect="1" noChangeArrowheads="1"/>
-          </p:cNvPicPr>
-          <p:nvPr/>
-        </p:nvPicPr>
-        <p:blipFill>
-          <a:blip r:embed="rId2">
-            <a:extLst>
-              <a:ext uri="{28A0092B-C50C-407E-A947-70E740481C1C}">
-                <a14:useLocalDpi xmlns:a14="http://schemas.microsoft.com/office/drawing/2010/main" val="0"/>
-              </a:ext>
-            </a:extLst>
-          </a:blip>
-          <a:srcRect/>
-          <a:stretch>
-            <a:fillRect/>
-          </a:stretch>
-        </p:blipFill>
-        <p:spPr bwMode="auto">
-          <a:xfrm>
-            <a:off x="5436096" y="1844824"/>
-            <a:ext cx="2370151" cy="3162844"/>
-          </a:xfrm>
-          <a:prstGeom prst="rect">
-            <a:avLst/>
-          </a:prstGeom>
-          <a:noFill/>
-          <a:extLst>
-            <a:ext uri="{909E8E84-426E-40DD-AFC4-6F175D3DCCD1}">
-              <a14:hiddenFill xmlns:a14="http://schemas.microsoft.com/office/drawing/2010/main">
-                <a:solidFill>
-                  <a:srgbClr val="FFFFFF"/>
-                </a:solidFill>
-              </a14:hiddenFill>
-            </a:ext>
-          </a:extLst>
-        </p:spPr>
-      </p:pic>
-    </p:spTree>
-    <p:extLst>
-      <p:ext uri="{BB962C8B-B14F-4D97-AF65-F5344CB8AC3E}">
-        <p14:creationId xmlns:p14="http://schemas.microsoft.com/office/powerpoint/2010/main" val="1629358162"/>
-      </p:ext>
-    </p:extLst>
-  </p:cSld>
-  <p:clrMapOvr>
-    <a:masterClrMapping/>
-  </p:clrMapOvr>
-  <p:timing>
-    <p:tnLst>
-      <p:par>
-        <p:cTn id="1" dur="indefinite" restart="never" nodeType="tmRoot"/>
-      </p:par>
-    </p:tnLst>
-  </p:timing>
-</p:sld>
-</file>
-
-<file path=ppt/slides/slide5.xml><?xml version="1.0" encoding="utf-8"?>
-<p:sld xmlns:a="http://schemas.openxmlformats.org/drawingml/2006/main" xmlns:r="http://schemas.openxmlformats.org/officeDocument/2006/relationships" xmlns:p="http://schemas.openxmlformats.org/presentationml/2006/main">
-  <p:cSld>
-    <p:spTree>
-      <p:nvGrpSpPr>
-        <p:cNvPr id="1" name=""/>
-        <p:cNvGrpSpPr/>
-        <p:nvPr/>
-      </p:nvGrpSpPr>
-      <p:grpSpPr>
-        <a:xfrm>
-          <a:off x="0" y="0"/>
-          <a:ext cx="0" cy="0"/>
-          <a:chOff x="0" y="0"/>
-          <a:chExt cx="0" cy="0"/>
-        </a:xfrm>
-      </p:grpSpPr>
-      <p:sp>
-        <p:nvSpPr>
-          <p:cNvPr id="2" name="Title 1"/>
-          <p:cNvSpPr>
-            <a:spLocks noGrp="1"/>
-          </p:cNvSpPr>
-          <p:nvPr>
-            <p:ph type="title"/>
-          </p:nvPr>
-        </p:nvSpPr>
-        <p:spPr/>
-        <p:txBody>
-          <a:bodyPr/>
-          <a:lstStyle/>
-          <a:p>
-            <a:r>
-              <a:rPr lang="en-GB" dirty="0" smtClean="0"/>
-              <a:t>Getting started the easy way</a:t>
-            </a:r>
-            <a:endParaRPr lang="en-GB" dirty="0"/>
-          </a:p>
-        </p:txBody>
-      </p:sp>
-      <p:sp>
-        <p:nvSpPr>
-          <p:cNvPr id="3" name="Content Placeholder 2"/>
-          <p:cNvSpPr>
-            <a:spLocks noGrp="1"/>
-          </p:cNvSpPr>
-          <p:nvPr>
-            <p:ph idx="1"/>
-          </p:nvPr>
-        </p:nvSpPr>
-        <p:spPr/>
-        <p:txBody>
-          <a:bodyPr/>
-          <a:lstStyle/>
-          <a:p>
-            <a:r>
-              <a:rPr lang="en-GB" dirty="0" smtClean="0"/>
-              <a:t>Install Visual Studio 2015 (any edition) (Win), or install Visual Studio Code (Win, Mac)</a:t>
-            </a:r>
-          </a:p>
-          <a:p>
-            <a:r>
-              <a:rPr lang="en-GB" dirty="0" smtClean="0"/>
-              <a:t>Install ASP.NET </a:t>
-            </a:r>
-            <a:r>
-              <a:rPr lang="en-GB" dirty="0" smtClean="0"/>
-              <a:t>Core </a:t>
-            </a:r>
-            <a:r>
-              <a:rPr lang="en-GB" dirty="0" smtClean="0"/>
-              <a:t>(Win, Mac)</a:t>
-            </a:r>
-          </a:p>
-          <a:p>
-            <a:endParaRPr lang="en-GB" dirty="0"/>
-          </a:p>
-          <a:p>
-            <a:endParaRPr lang="en-GB" dirty="0" smtClean="0"/>
-          </a:p>
-          <a:p>
-            <a:pPr marL="45720" indent="0" algn="ctr">
-              <a:buNone/>
-            </a:pPr>
-            <a:r>
-              <a:rPr lang="en-GB" sz="6000" dirty="0" smtClean="0">
-                <a:solidFill>
-                  <a:srgbClr val="00B050"/>
-                </a:solidFill>
-                <a:hlinkClick r:id="rId2"/>
-              </a:rPr>
-              <a:t>http</a:t>
-            </a:r>
-            <a:r>
-              <a:rPr lang="en-GB" sz="6000" dirty="0" smtClean="0">
-                <a:solidFill>
-                  <a:srgbClr val="00B050"/>
-                </a:solidFill>
-                <a:hlinkClick r:id="rId2"/>
-              </a:rPr>
-              <a:t>://dot.</a:t>
-            </a:r>
-            <a:r>
-              <a:rPr lang="en-GB" sz="6000" dirty="0" smtClean="0">
-                <a:solidFill>
-                  <a:srgbClr val="00B050"/>
-                </a:solidFill>
-                <a:hlinkClick r:id="rId3"/>
-              </a:rPr>
-              <a:t>n</a:t>
-            </a:r>
-            <a:r>
-              <a:rPr lang="en-GB" sz="6000" dirty="0" smtClean="0">
-                <a:solidFill>
-                  <a:srgbClr val="00B050"/>
-                </a:solidFill>
-                <a:hlinkClick r:id="rId2"/>
-              </a:rPr>
-              <a:t>et</a:t>
-            </a:r>
-            <a:endParaRPr lang="en-GB" sz="6000" dirty="0">
-              <a:solidFill>
-                <a:srgbClr val="00B050"/>
-              </a:solidFill>
-            </a:endParaRPr>
-          </a:p>
-        </p:txBody>
-      </p:sp>
-    </p:spTree>
-    <p:extLst>
-      <p:ext uri="{BB962C8B-B14F-4D97-AF65-F5344CB8AC3E}">
-        <p14:creationId xmlns:p14="http://schemas.microsoft.com/office/powerpoint/2010/main" val="1697989239"/>
-      </p:ext>
-    </p:extLst>
-  </p:cSld>
-  <p:clrMapOvr>
-    <a:masterClrMapping/>
-  </p:clrMapOvr>
-  <p:timing>
-    <p:tnLst>
-      <p:par>
-        <p:cTn id="1" dur="indefinite" restart="never" nodeType="tmRoot"/>
-      </p:par>
-    </p:tnLst>
-  </p:timing>
-</p:sld>
-</file>
-
-<file path=ppt/slides/slide6.xml><?xml version="1.0" encoding="utf-8"?>
-<p:sld xmlns:a="http://schemas.openxmlformats.org/drawingml/2006/main" xmlns:r="http://schemas.openxmlformats.org/officeDocument/2006/relationships" xmlns:p="http://schemas.openxmlformats.org/presentationml/2006/main">
-  <p:cSld>
-    <p:spTree>
-      <p:nvGrpSpPr>
-        <p:cNvPr id="1" name=""/>
-        <p:cNvGrpSpPr/>
-        <p:nvPr/>
-      </p:nvGrpSpPr>
-      <p:grpSpPr>
-        <a:xfrm>
-          <a:off x="0" y="0"/>
-          <a:ext cx="0" cy="0"/>
-          <a:chOff x="0" y="0"/>
-          <a:chExt cx="0" cy="0"/>
-        </a:xfrm>
-      </p:grpSpPr>
-      <p:sp>
-        <p:nvSpPr>
-          <p:cNvPr id="2" name="Title 1"/>
-          <p:cNvSpPr>
-            <a:spLocks noGrp="1"/>
-          </p:cNvSpPr>
-          <p:nvPr>
-            <p:ph type="title"/>
-          </p:nvPr>
-        </p:nvSpPr>
-        <p:spPr/>
-        <p:txBody>
-          <a:bodyPr>
-            <a:normAutofit fontScale="90000"/>
-          </a:bodyPr>
-          <a:lstStyle/>
-          <a:p>
-            <a:r>
-              <a:rPr lang="en-GB" dirty="0" smtClean="0"/>
-              <a:t>Getting started the slightly more complicate way</a:t>
-            </a:r>
-            <a:endParaRPr lang="en-GB" dirty="0"/>
-          </a:p>
-        </p:txBody>
-      </p:sp>
-      <p:sp>
-        <p:nvSpPr>
-          <p:cNvPr id="3" name="Content Placeholder 2"/>
-          <p:cNvSpPr>
-            <a:spLocks noGrp="1"/>
-          </p:cNvSpPr>
-          <p:nvPr>
-            <p:ph idx="1"/>
-          </p:nvPr>
-        </p:nvSpPr>
-        <p:spPr/>
-        <p:txBody>
-          <a:bodyPr/>
-          <a:lstStyle/>
-          <a:p>
-            <a:r>
-              <a:rPr lang="en-GB" dirty="0" smtClean="0"/>
-              <a:t>Install .NET Version Manager (DNVM)</a:t>
-            </a:r>
-          </a:p>
-          <a:p>
-            <a:r>
-              <a:rPr lang="en-GB" dirty="0" smtClean="0"/>
-              <a:t>Install the Execution Runtime (DNX) using the DNVM</a:t>
-            </a:r>
-          </a:p>
-          <a:p>
-            <a:r>
-              <a:rPr lang="en-GB" dirty="0" smtClean="0"/>
-              <a:t>On Linux, also need to install </a:t>
-            </a:r>
-            <a:r>
-              <a:rPr lang="en-GB" dirty="0" err="1" smtClean="0"/>
-              <a:t>Libuv</a:t>
-            </a:r>
-            <a:endParaRPr lang="en-GB" dirty="0"/>
-          </a:p>
-        </p:txBody>
-      </p:sp>
-    </p:spTree>
-    <p:extLst>
-      <p:ext uri="{BB962C8B-B14F-4D97-AF65-F5344CB8AC3E}">
-        <p14:creationId xmlns:p14="http://schemas.microsoft.com/office/powerpoint/2010/main" val="2305085593"/>
-      </p:ext>
-    </p:extLst>
-  </p:cSld>
-  <p:clrMapOvr>
-    <a:masterClrMapping/>
-  </p:clrMapOvr>
-  <p:timing>
-    <p:tnLst>
-      <p:par>
-        <p:cTn id="1" dur="indefinite" restart="never" nodeType="tmRoot"/>
-      </p:par>
-    </p:tnLst>
-  </p:timing>
-</p:sld>
-</file>
-
-<file path=ppt/slides/slide7.xml><?xml version="1.0" encoding="utf-8"?>
-<p:sld xmlns:a="http://schemas.openxmlformats.org/drawingml/2006/main" xmlns:r="http://schemas.openxmlformats.org/officeDocument/2006/relationships" xmlns:p="http://schemas.openxmlformats.org/presentationml/2006/main">
-  <p:cSld>
-    <p:spTree>
-      <p:nvGrpSpPr>
-        <p:cNvPr id="1" name=""/>
-        <p:cNvGrpSpPr/>
-        <p:nvPr/>
-      </p:nvGrpSpPr>
-      <p:grpSpPr>
-        <a:xfrm>
-          <a:off x="0" y="0"/>
-          <a:ext cx="0" cy="0"/>
-          <a:chOff x="0" y="0"/>
-          <a:chExt cx="0" cy="0"/>
-        </a:xfrm>
-      </p:grpSpPr>
-      <p:sp>
-        <p:nvSpPr>
-          <p:cNvPr id="2" name="Title 1"/>
-          <p:cNvSpPr>
-            <a:spLocks noGrp="1"/>
-          </p:cNvSpPr>
-          <p:nvPr>
-            <p:ph type="title"/>
-          </p:nvPr>
-        </p:nvSpPr>
-        <p:spPr/>
-        <p:txBody>
-          <a:bodyPr/>
-          <a:lstStyle/>
-          <a:p>
-            <a:r>
-              <a:rPr lang="en-GB" dirty="0" smtClean="0"/>
-              <a:t>What’s all DN* stuff?</a:t>
-            </a:r>
-            <a:endParaRPr lang="en-GB" dirty="0"/>
-          </a:p>
-        </p:txBody>
-      </p:sp>
-      <p:sp>
-        <p:nvSpPr>
-          <p:cNvPr id="3" name="Content Placeholder 2"/>
-          <p:cNvSpPr>
-            <a:spLocks noGrp="1"/>
-          </p:cNvSpPr>
-          <p:nvPr>
-            <p:ph idx="1"/>
-          </p:nvPr>
-        </p:nvSpPr>
-        <p:spPr/>
-        <p:txBody>
-          <a:bodyPr/>
-          <a:lstStyle/>
-          <a:p>
-            <a:r>
-              <a:rPr lang="en-GB" dirty="0" smtClean="0"/>
-              <a:t>DNX: .NET Execution Environment</a:t>
-            </a:r>
-          </a:p>
-          <a:p>
-            <a:pPr lvl="1"/>
-            <a:r>
-              <a:rPr lang="en-GB" dirty="0" smtClean="0"/>
-              <a:t>Execution Runtime</a:t>
-            </a:r>
-          </a:p>
-          <a:p>
-            <a:pPr lvl="1"/>
-            <a:r>
-              <a:rPr lang="en-GB" dirty="0" smtClean="0"/>
-              <a:t>Host process</a:t>
-            </a:r>
-          </a:p>
-          <a:p>
-            <a:pPr lvl="1"/>
-            <a:r>
-              <a:rPr lang="en-GB" dirty="0" err="1" smtClean="0"/>
-              <a:t>Startup</a:t>
-            </a:r>
-            <a:endParaRPr lang="en-GB" dirty="0" smtClean="0"/>
-          </a:p>
-          <a:p>
-            <a:r>
-              <a:rPr lang="en-GB" dirty="0" smtClean="0"/>
-              <a:t>DNU: DNX Utilities</a:t>
-            </a:r>
-          </a:p>
-          <a:p>
-            <a:pPr lvl="1"/>
-            <a:r>
-              <a:rPr lang="en-GB" dirty="0" smtClean="0"/>
-              <a:t>Packages management</a:t>
-            </a:r>
-            <a:endParaRPr lang="en-GB" dirty="0"/>
-          </a:p>
-          <a:p>
-            <a:r>
-              <a:rPr lang="en-GB" dirty="0" smtClean="0"/>
-              <a:t>DNVM: DNX Version Manager</a:t>
-            </a:r>
-          </a:p>
-          <a:p>
-            <a:pPr lvl="1"/>
-            <a:r>
-              <a:rPr lang="en-GB" dirty="0" smtClean="0"/>
-              <a:t>Manages multiple versions of DNX</a:t>
-            </a:r>
-          </a:p>
-          <a:p>
-            <a:pPr lvl="1"/>
-            <a:r>
-              <a:rPr lang="en-GB" dirty="0" smtClean="0"/>
-              <a:t>Downloads latest (or any) version</a:t>
-            </a:r>
-          </a:p>
-        </p:txBody>
-      </p:sp>
-    </p:spTree>
-    <p:extLst>
-      <p:ext uri="{BB962C8B-B14F-4D97-AF65-F5344CB8AC3E}">
-        <p14:creationId xmlns:p14="http://schemas.microsoft.com/office/powerpoint/2010/main" val="1496549051"/>
-      </p:ext>
-    </p:extLst>
-  </p:cSld>
-  <p:clrMapOvr>
-    <a:masterClrMapping/>
-  </p:clrMapOvr>
-  <p:timing>
-    <p:tnLst>
-      <p:par>
-        <p:cTn id="1" dur="indefinite" restart="never" nodeType="tmRoot"/>
-      </p:par>
-    </p:tnLst>
-  </p:timing>
-</p:sld>
-</file>
-
-<file path=ppt/slides/slide8.xml><?xml version="1.0" encoding="utf-8"?>
-<p:sld xmlns:a="http://schemas.openxmlformats.org/drawingml/2006/main" xmlns:r="http://schemas.openxmlformats.org/officeDocument/2006/relationships" xmlns:p="http://schemas.openxmlformats.org/presentationml/2006/main">
-  <p:cSld>
-    <p:spTree>
-      <p:nvGrpSpPr>
-        <p:cNvPr id="1" name=""/>
-        <p:cNvGrpSpPr/>
-        <p:nvPr/>
-      </p:nvGrpSpPr>
-      <p:grpSpPr>
-        <a:xfrm>
-          <a:off x="0" y="0"/>
-          <a:ext cx="0" cy="0"/>
-          <a:chOff x="0" y="0"/>
-          <a:chExt cx="0" cy="0"/>
-        </a:xfrm>
-      </p:grpSpPr>
-      <p:sp>
-        <p:nvSpPr>
-          <p:cNvPr id="2" name="Title 1"/>
-          <p:cNvSpPr>
-            <a:spLocks noGrp="1"/>
-          </p:cNvSpPr>
-          <p:nvPr>
-            <p:ph type="title"/>
-          </p:nvPr>
-        </p:nvSpPr>
-        <p:spPr/>
-        <p:txBody>
-          <a:bodyPr/>
-          <a:lstStyle/>
-          <a:p>
-            <a:r>
-              <a:rPr lang="en-GB" dirty="0" smtClean="0"/>
-              <a:t>Console Application</a:t>
-            </a:r>
-            <a:endParaRPr lang="en-GB" dirty="0"/>
-          </a:p>
-        </p:txBody>
-      </p:sp>
-      <p:sp>
-        <p:nvSpPr>
-          <p:cNvPr id="3" name="Content Placeholder 2"/>
-          <p:cNvSpPr>
-            <a:spLocks noGrp="1"/>
-          </p:cNvSpPr>
-          <p:nvPr>
-            <p:ph idx="1"/>
-          </p:nvPr>
-        </p:nvSpPr>
-        <p:spPr/>
-        <p:txBody>
-          <a:bodyPr/>
-          <a:lstStyle/>
-          <a:p>
-            <a:endParaRPr lang="en-GB" dirty="0"/>
-          </a:p>
-        </p:txBody>
-      </p:sp>
-    </p:spTree>
-    <p:extLst>
-      <p:ext uri="{BB962C8B-B14F-4D97-AF65-F5344CB8AC3E}">
-        <p14:creationId xmlns:p14="http://schemas.microsoft.com/office/powerpoint/2010/main" val="2589787921"/>
-      </p:ext>
-    </p:extLst>
-  </p:cSld>
-  <p:clrMapOvr>
-    <a:masterClrMapping/>
-  </p:clrMapOvr>
-  <p:timing>
-    <p:tnLst>
-      <p:par>
-        <p:cTn id="1" dur="indefinite" restart="never" nodeType="tmRoot"/>
-      </p:par>
-    </p:tnLst>
-  </p:timing>
-</p:sld>
-</file>
-
-<file path=ppt/slides/slide9.xml><?xml version="1.0" encoding="utf-8"?>
-<p:sld xmlns:a="http://schemas.openxmlformats.org/drawingml/2006/main" xmlns:r="http://schemas.openxmlformats.org/officeDocument/2006/relationships" xmlns:p="http://schemas.openxmlformats.org/presentationml/2006/main">
-  <p:cSld>
-    <p:spTree>
-      <p:nvGrpSpPr>
-        <p:cNvPr id="1" name=""/>
-        <p:cNvGrpSpPr/>
-        <p:nvPr/>
-      </p:nvGrpSpPr>
-      <p:grpSpPr>
-        <a:xfrm>
-          <a:off x="0" y="0"/>
-          <a:ext cx="0" cy="0"/>
-          <a:chOff x="0" y="0"/>
-          <a:chExt cx="0" cy="0"/>
-        </a:xfrm>
-      </p:grpSpPr>
-      <p:sp>
-        <p:nvSpPr>
-          <p:cNvPr id="2" name="Title 1"/>
-          <p:cNvSpPr>
-            <a:spLocks noGrp="1"/>
-          </p:cNvSpPr>
-          <p:nvPr>
-            <p:ph type="title"/>
-          </p:nvPr>
-        </p:nvSpPr>
-        <p:spPr/>
-        <p:txBody>
-          <a:bodyPr/>
-          <a:lstStyle/>
-          <a:p>
-            <a:r>
-              <a:rPr lang="en-GB" dirty="0" err="1" smtClean="0"/>
-              <a:t>Project.json</a:t>
-            </a:r>
-            <a:endParaRPr lang="en-GB" dirty="0"/>
-          </a:p>
-        </p:txBody>
-      </p:sp>
-      <p:sp>
-        <p:nvSpPr>
-          <p:cNvPr id="3" name="Content Placeholder 2"/>
-          <p:cNvSpPr>
-            <a:spLocks noGrp="1"/>
-          </p:cNvSpPr>
-          <p:nvPr>
-            <p:ph idx="1"/>
-          </p:nvPr>
-        </p:nvSpPr>
-        <p:spPr>
-          <a:xfrm>
-            <a:off x="914400" y="2769833"/>
-            <a:ext cx="2793504" cy="3539527"/>
-          </a:xfrm>
-        </p:spPr>
-        <p:txBody>
-          <a:bodyPr/>
-          <a:lstStyle/>
-          <a:p>
-            <a:r>
-              <a:rPr lang="en-GB" dirty="0" smtClean="0"/>
-              <a:t>Metadata</a:t>
-            </a:r>
-          </a:p>
-          <a:p>
-            <a:r>
-              <a:rPr lang="en-GB" dirty="0" smtClean="0"/>
-              <a:t>Dependencies</a:t>
-            </a:r>
-          </a:p>
-          <a:p>
-            <a:r>
-              <a:rPr lang="en-GB" dirty="0" smtClean="0"/>
-              <a:t>Frameworks</a:t>
-            </a:r>
-          </a:p>
-          <a:p>
-            <a:r>
-              <a:rPr lang="en-GB" dirty="0" smtClean="0"/>
-              <a:t>Commands</a:t>
-            </a:r>
-          </a:p>
-          <a:p>
-            <a:r>
-              <a:rPr lang="en-GB" dirty="0" smtClean="0"/>
-              <a:t>Configuration</a:t>
-            </a:r>
-          </a:p>
-          <a:p>
-            <a:r>
-              <a:rPr lang="en-GB" dirty="0" smtClean="0"/>
-              <a:t>Source files</a:t>
-            </a:r>
-          </a:p>
-          <a:p>
-            <a:r>
-              <a:rPr lang="en-GB" dirty="0" smtClean="0"/>
-              <a:t>Scripts</a:t>
-            </a:r>
-          </a:p>
-          <a:p>
-            <a:endParaRPr lang="en-GB" dirty="0"/>
-          </a:p>
-        </p:txBody>
-      </p:sp>
-      <p:sp>
-        <p:nvSpPr>
-          <p:cNvPr id="4" name="TextBox 3"/>
-          <p:cNvSpPr txBox="1"/>
-          <p:nvPr/>
-        </p:nvSpPr>
-        <p:spPr>
-          <a:xfrm>
-            <a:off x="3707904" y="836712"/>
-            <a:ext cx="5616624" cy="5632311"/>
-          </a:xfrm>
-          <a:prstGeom prst="rect">
-            <a:avLst/>
-          </a:prstGeom>
-          <a:noFill/>
-        </p:spPr>
-        <p:txBody>
-          <a:bodyPr wrap="square" rtlCol="0">
-            <a:spAutoFit/>
-          </a:bodyPr>
-          <a:lstStyle/>
-          <a:p>
-            <a:r>
-              <a:rPr lang="en-GB" sz="1000" dirty="0">
-                <a:latin typeface="Consolas" panose="020B0609020204030204" pitchFamily="49" charset="0"/>
-              </a:rPr>
-              <a:t>{</a:t>
-            </a:r>
-          </a:p>
-          <a:p>
-            <a:r>
-              <a:rPr lang="en-GB" sz="1000" dirty="0">
-                <a:latin typeface="Consolas" panose="020B0609020204030204" pitchFamily="49" charset="0"/>
-              </a:rPr>
-              <a:t>  "version": "1.0.0-</a:t>
-            </a:r>
-            <a:r>
-              <a:rPr lang="en-GB" sz="1000" dirty="0" smtClean="0">
-                <a:latin typeface="Consolas" panose="020B0609020204030204" pitchFamily="49" charset="0"/>
-              </a:rPr>
-              <a:t>*",</a:t>
-            </a:r>
-          </a:p>
-          <a:p>
-            <a:r>
-              <a:rPr lang="en-GB" sz="1000" dirty="0">
-                <a:latin typeface="Consolas" panose="020B0609020204030204" pitchFamily="49" charset="0"/>
-              </a:rPr>
-              <a:t> </a:t>
-            </a:r>
-            <a:r>
-              <a:rPr lang="en-GB" sz="1000" dirty="0" smtClean="0">
-                <a:latin typeface="Consolas" panose="020B0609020204030204" pitchFamily="49" charset="0"/>
-              </a:rPr>
-              <a:t> "author": </a:t>
-            </a:r>
-            <a:r>
-              <a:rPr lang="en-GB" sz="1000" dirty="0">
-                <a:latin typeface="Consolas" panose="020B0609020204030204" pitchFamily="49" charset="0"/>
-              </a:rPr>
-              <a:t>"</a:t>
-            </a:r>
-            <a:r>
-              <a:rPr lang="en-GB" sz="1000" dirty="0" smtClean="0">
-                <a:latin typeface="Consolas" panose="020B0609020204030204" pitchFamily="49" charset="0"/>
-              </a:rPr>
-              <a:t>Simone Chiaretta“,</a:t>
-            </a:r>
-            <a:endParaRPr lang="en-GB" sz="1000" dirty="0">
-              <a:latin typeface="Consolas" panose="020B0609020204030204" pitchFamily="49" charset="0"/>
-            </a:endParaRPr>
-          </a:p>
-          <a:p>
-            <a:endParaRPr lang="en-GB" sz="1000" dirty="0">
-              <a:latin typeface="Consolas" panose="020B0609020204030204" pitchFamily="49" charset="0"/>
-            </a:endParaRPr>
-          </a:p>
-          <a:p>
-            <a:r>
-              <a:rPr lang="en-GB" sz="1000" dirty="0">
-                <a:latin typeface="Consolas" panose="020B0609020204030204" pitchFamily="49" charset="0"/>
-              </a:rPr>
-              <a:t>  "dependencies": {</a:t>
-            </a:r>
-          </a:p>
-          <a:p>
-            <a:r>
-              <a:rPr lang="en-GB" sz="1000" dirty="0">
-                <a:latin typeface="Consolas" panose="020B0609020204030204" pitchFamily="49" charset="0"/>
-              </a:rPr>
-              <a:t>    "</a:t>
-            </a:r>
-            <a:r>
-              <a:rPr lang="en-GB" sz="1000" dirty="0" err="1">
-                <a:latin typeface="Consolas" panose="020B0609020204030204" pitchFamily="49" charset="0"/>
-              </a:rPr>
-              <a:t>Microsoft.AspNet.Diagnostics</a:t>
-            </a:r>
-            <a:r>
-              <a:rPr lang="en-GB" sz="1000" dirty="0">
-                <a:latin typeface="Consolas" panose="020B0609020204030204" pitchFamily="49" charset="0"/>
-              </a:rPr>
-              <a:t>": "1.0.0-rc1-final",</a:t>
-            </a:r>
-          </a:p>
-          <a:p>
-            <a:r>
-              <a:rPr lang="en-GB" sz="1000" dirty="0">
-                <a:latin typeface="Consolas" panose="020B0609020204030204" pitchFamily="49" charset="0"/>
-              </a:rPr>
-              <a:t>    "</a:t>
-            </a:r>
-            <a:r>
-              <a:rPr lang="en-GB" sz="1000" dirty="0" err="1">
-                <a:latin typeface="Consolas" panose="020B0609020204030204" pitchFamily="49" charset="0"/>
-              </a:rPr>
-              <a:t>Microsoft.AspNet.IISPlatformHandler</a:t>
-            </a:r>
-            <a:r>
-              <a:rPr lang="en-GB" sz="1000" dirty="0">
-                <a:latin typeface="Consolas" panose="020B0609020204030204" pitchFamily="49" charset="0"/>
-              </a:rPr>
-              <a:t>": "1.0.0-rc1-final",</a:t>
-            </a:r>
-          </a:p>
-          <a:p>
-            <a:r>
-              <a:rPr lang="en-GB" sz="1000" dirty="0" smtClean="0">
-                <a:latin typeface="Consolas" panose="020B0609020204030204" pitchFamily="49" charset="0"/>
-              </a:rPr>
-              <a:t>    ...,</a:t>
-            </a:r>
-          </a:p>
-          <a:p>
-            <a:r>
-              <a:rPr lang="en-GB" sz="1000" dirty="0">
-                <a:latin typeface="Consolas" panose="020B0609020204030204" pitchFamily="49" charset="0"/>
-              </a:rPr>
-              <a:t> </a:t>
-            </a:r>
-            <a:r>
-              <a:rPr lang="en-GB" sz="1000" dirty="0" smtClean="0">
-                <a:latin typeface="Consolas" panose="020B0609020204030204" pitchFamily="49" charset="0"/>
-              </a:rPr>
-              <a:t>   "</a:t>
-            </a:r>
-            <a:r>
-              <a:rPr lang="en-GB" sz="1000" dirty="0" err="1">
-                <a:latin typeface="Consolas" panose="020B0609020204030204" pitchFamily="49" charset="0"/>
-              </a:rPr>
-              <a:t>Microsoft.VisualStudio.Web.BrowserLink.Loader</a:t>
-            </a:r>
-            <a:r>
-              <a:rPr lang="en-GB" sz="1000" dirty="0">
-                <a:latin typeface="Consolas" panose="020B0609020204030204" pitchFamily="49" charset="0"/>
-              </a:rPr>
-              <a:t>": "14.0.0-rc1-final"</a:t>
-            </a:r>
-          </a:p>
-          <a:p>
-            <a:r>
-              <a:rPr lang="en-GB" sz="1000" dirty="0">
-                <a:latin typeface="Consolas" panose="020B0609020204030204" pitchFamily="49" charset="0"/>
-              </a:rPr>
-              <a:t>  </a:t>
-            </a:r>
-            <a:r>
-              <a:rPr lang="en-GB" sz="1000" dirty="0" smtClean="0">
-                <a:latin typeface="Consolas" panose="020B0609020204030204" pitchFamily="49" charset="0"/>
-              </a:rPr>
-              <a:t>},</a:t>
-            </a:r>
-          </a:p>
-          <a:p>
-            <a:r>
-              <a:rPr lang="en-GB" sz="1000" dirty="0">
-                <a:latin typeface="Consolas" panose="020B0609020204030204" pitchFamily="49" charset="0"/>
-              </a:rPr>
-              <a:t> </a:t>
-            </a:r>
-            <a:r>
-              <a:rPr lang="en-GB" sz="1000" dirty="0" smtClean="0">
-                <a:latin typeface="Consolas" panose="020B0609020204030204" pitchFamily="49" charset="0"/>
-              </a:rPr>
-              <a:t>  "</a:t>
-            </a:r>
-            <a:r>
-              <a:rPr lang="en-GB" sz="1000" dirty="0">
-                <a:latin typeface="Consolas" panose="020B0609020204030204" pitchFamily="49" charset="0"/>
-              </a:rPr>
-              <a:t>frameworks": {</a:t>
-            </a:r>
-          </a:p>
-          <a:p>
-            <a:r>
-              <a:rPr lang="en-GB" sz="1000" dirty="0">
-                <a:latin typeface="Consolas" panose="020B0609020204030204" pitchFamily="49" charset="0"/>
-              </a:rPr>
-              <a:t>    "dnx451": { },</a:t>
-            </a:r>
-          </a:p>
-          <a:p>
-            <a:r>
-              <a:rPr lang="en-GB" sz="1000" dirty="0">
-                <a:latin typeface="Consolas" panose="020B0609020204030204" pitchFamily="49" charset="0"/>
-              </a:rPr>
-              <a:t>    "dnxcore50": { }</a:t>
-            </a:r>
-          </a:p>
-          <a:p>
-            <a:r>
-              <a:rPr lang="en-GB" sz="1000" dirty="0">
-                <a:latin typeface="Consolas" panose="020B0609020204030204" pitchFamily="49" charset="0"/>
-              </a:rPr>
-              <a:t>  },</a:t>
-            </a:r>
-          </a:p>
-          <a:p>
-            <a:endParaRPr lang="en-GB" sz="1000" dirty="0">
-              <a:latin typeface="Consolas" panose="020B0609020204030204" pitchFamily="49" charset="0"/>
-            </a:endParaRPr>
-          </a:p>
-          <a:p>
-            <a:r>
-              <a:rPr lang="en-GB" sz="1000" dirty="0">
-                <a:latin typeface="Consolas" panose="020B0609020204030204" pitchFamily="49" charset="0"/>
-              </a:rPr>
-              <a:t>  "commands": {</a:t>
-            </a:r>
-          </a:p>
-          <a:p>
-            <a:r>
-              <a:rPr lang="en-GB" sz="1000" dirty="0">
-                <a:latin typeface="Consolas" panose="020B0609020204030204" pitchFamily="49" charset="0"/>
-              </a:rPr>
-              <a:t>    "web": "</a:t>
-            </a:r>
-            <a:r>
-              <a:rPr lang="en-GB" sz="1000" dirty="0" err="1">
-                <a:latin typeface="Consolas" panose="020B0609020204030204" pitchFamily="49" charset="0"/>
-              </a:rPr>
-              <a:t>Microsoft.AspNet.Server.Kestrel</a:t>
-            </a:r>
-            <a:r>
-              <a:rPr lang="en-GB" sz="1000" dirty="0">
-                <a:latin typeface="Consolas" panose="020B0609020204030204" pitchFamily="49" charset="0"/>
-              </a:rPr>
-              <a:t>"</a:t>
-            </a:r>
-          </a:p>
-          <a:p>
-            <a:r>
-              <a:rPr lang="en-GB" sz="1000" dirty="0">
-                <a:latin typeface="Consolas" panose="020B0609020204030204" pitchFamily="49" charset="0"/>
-              </a:rPr>
-              <a:t>  },</a:t>
-            </a:r>
-          </a:p>
-          <a:p>
-            <a:r>
-              <a:rPr lang="en-GB" sz="1000" dirty="0">
-                <a:latin typeface="Consolas" panose="020B0609020204030204" pitchFamily="49" charset="0"/>
-              </a:rPr>
-              <a:t> </a:t>
-            </a:r>
-            <a:r>
-              <a:rPr lang="en-GB" sz="1000" dirty="0" smtClean="0">
-                <a:latin typeface="Consolas" panose="020B0609020204030204" pitchFamily="49" charset="0"/>
-              </a:rPr>
-              <a:t> "</a:t>
-            </a:r>
-            <a:r>
-              <a:rPr lang="en-GB" sz="1000" dirty="0" err="1">
-                <a:latin typeface="Consolas" panose="020B0609020204030204" pitchFamily="49" charset="0"/>
-              </a:rPr>
-              <a:t>compilationOptions</a:t>
-            </a:r>
-            <a:r>
-              <a:rPr lang="en-GB" sz="1000" dirty="0">
-                <a:latin typeface="Consolas" panose="020B0609020204030204" pitchFamily="49" charset="0"/>
-              </a:rPr>
-              <a:t>": {</a:t>
-            </a:r>
-          </a:p>
-          <a:p>
-            <a:r>
-              <a:rPr lang="en-GB" sz="1000" dirty="0">
-                <a:latin typeface="Consolas" panose="020B0609020204030204" pitchFamily="49" charset="0"/>
-              </a:rPr>
-              <a:t>    "</a:t>
-            </a:r>
-            <a:r>
-              <a:rPr lang="en-GB" sz="1000" dirty="0" err="1">
-                <a:latin typeface="Consolas" panose="020B0609020204030204" pitchFamily="49" charset="0"/>
-              </a:rPr>
-              <a:t>emitEntryPoint</a:t>
-            </a:r>
-            <a:r>
-              <a:rPr lang="en-GB" sz="1000" dirty="0">
-                <a:latin typeface="Consolas" panose="020B0609020204030204" pitchFamily="49" charset="0"/>
-              </a:rPr>
-              <a:t>": true</a:t>
-            </a:r>
-          </a:p>
-          <a:p>
-            <a:r>
-              <a:rPr lang="en-GB" sz="1000" dirty="0">
-                <a:latin typeface="Consolas" panose="020B0609020204030204" pitchFamily="49" charset="0"/>
-              </a:rPr>
-              <a:t>  },</a:t>
-            </a:r>
-          </a:p>
-          <a:p>
-            <a:endParaRPr lang="en-GB" sz="1000" dirty="0">
-              <a:latin typeface="Consolas" panose="020B0609020204030204" pitchFamily="49" charset="0"/>
-            </a:endParaRPr>
-          </a:p>
-          <a:p>
-            <a:r>
-              <a:rPr lang="en-GB" sz="1000" dirty="0">
-                <a:latin typeface="Consolas" panose="020B0609020204030204" pitchFamily="49" charset="0"/>
-              </a:rPr>
-              <a:t>  "exclude": [</a:t>
-            </a:r>
-          </a:p>
-          <a:p>
-            <a:r>
-              <a:rPr lang="en-GB" sz="1000" dirty="0">
-                <a:latin typeface="Consolas" panose="020B0609020204030204" pitchFamily="49" charset="0"/>
-              </a:rPr>
-              <a:t>    "</a:t>
-            </a:r>
-            <a:r>
-              <a:rPr lang="en-GB" sz="1000" dirty="0" err="1">
-                <a:latin typeface="Consolas" panose="020B0609020204030204" pitchFamily="49" charset="0"/>
-              </a:rPr>
-              <a:t>wwwroot</a:t>
-            </a:r>
-            <a:r>
-              <a:rPr lang="en-GB" sz="1000" dirty="0">
-                <a:latin typeface="Consolas" panose="020B0609020204030204" pitchFamily="49" charset="0"/>
-              </a:rPr>
-              <a:t>",</a:t>
-            </a:r>
-          </a:p>
-          <a:p>
-            <a:r>
-              <a:rPr lang="en-GB" sz="1000" dirty="0">
-                <a:latin typeface="Consolas" panose="020B0609020204030204" pitchFamily="49" charset="0"/>
-              </a:rPr>
-              <a:t>    "</a:t>
-            </a:r>
-            <a:r>
-              <a:rPr lang="en-GB" sz="1000" dirty="0" err="1">
-                <a:latin typeface="Consolas" panose="020B0609020204030204" pitchFamily="49" charset="0"/>
-              </a:rPr>
-              <a:t>node_modules</a:t>
-            </a:r>
-            <a:r>
-              <a:rPr lang="en-GB" sz="1000" dirty="0">
-                <a:latin typeface="Consolas" panose="020B0609020204030204" pitchFamily="49" charset="0"/>
-              </a:rPr>
-              <a:t>"</a:t>
-            </a:r>
-          </a:p>
-          <a:p>
-            <a:r>
-              <a:rPr lang="en-GB" sz="1000" dirty="0">
-                <a:latin typeface="Consolas" panose="020B0609020204030204" pitchFamily="49" charset="0"/>
-              </a:rPr>
-              <a:t>  ],</a:t>
-            </a:r>
-          </a:p>
-          <a:p>
-            <a:r>
-              <a:rPr lang="en-GB" sz="1000" dirty="0">
-                <a:latin typeface="Consolas" panose="020B0609020204030204" pitchFamily="49" charset="0"/>
-              </a:rPr>
-              <a:t>  "</a:t>
-            </a:r>
-            <a:r>
-              <a:rPr lang="en-GB" sz="1000" dirty="0" err="1">
-                <a:latin typeface="Consolas" panose="020B0609020204030204" pitchFamily="49" charset="0"/>
-              </a:rPr>
-              <a:t>publishExclude</a:t>
-            </a:r>
-            <a:r>
-              <a:rPr lang="en-GB" sz="1000" dirty="0">
-                <a:latin typeface="Consolas" panose="020B0609020204030204" pitchFamily="49" charset="0"/>
-              </a:rPr>
-              <a:t>": [</a:t>
-            </a:r>
-          </a:p>
-          <a:p>
-            <a:r>
-              <a:rPr lang="en-GB" sz="1000" dirty="0">
-                <a:latin typeface="Consolas" panose="020B0609020204030204" pitchFamily="49" charset="0"/>
-              </a:rPr>
-              <a:t>    "**.user",</a:t>
-            </a:r>
-          </a:p>
-          <a:p>
-            <a:r>
-              <a:rPr lang="en-GB" sz="1000" dirty="0">
-                <a:latin typeface="Consolas" panose="020B0609020204030204" pitchFamily="49" charset="0"/>
-              </a:rPr>
-              <a:t>    "**.</a:t>
-            </a:r>
-            <a:r>
-              <a:rPr lang="en-GB" sz="1000" dirty="0" err="1">
-                <a:latin typeface="Consolas" panose="020B0609020204030204" pitchFamily="49" charset="0"/>
-              </a:rPr>
-              <a:t>vspscc</a:t>
-            </a:r>
-            <a:r>
-              <a:rPr lang="en-GB" sz="1000" dirty="0">
-                <a:latin typeface="Consolas" panose="020B0609020204030204" pitchFamily="49" charset="0"/>
-              </a:rPr>
-              <a:t>"</a:t>
-            </a:r>
-          </a:p>
-          <a:p>
-            <a:r>
-              <a:rPr lang="en-GB" sz="1000" dirty="0">
-                <a:latin typeface="Consolas" panose="020B0609020204030204" pitchFamily="49" charset="0"/>
-              </a:rPr>
-              <a:t>  ],</a:t>
-            </a:r>
-          </a:p>
-          <a:p>
-            <a:r>
-              <a:rPr lang="en-GB" sz="1000" dirty="0">
-                <a:latin typeface="Consolas" panose="020B0609020204030204" pitchFamily="49" charset="0"/>
-              </a:rPr>
-              <a:t>  "scripts": {</a:t>
-            </a:r>
-          </a:p>
-          <a:p>
-            <a:r>
-              <a:rPr lang="en-GB" sz="1000" dirty="0">
-                <a:latin typeface="Consolas" panose="020B0609020204030204" pitchFamily="49" charset="0"/>
-              </a:rPr>
-              <a:t>    "</a:t>
-            </a:r>
-            <a:r>
-              <a:rPr lang="en-GB" sz="1000" dirty="0" err="1">
-                <a:latin typeface="Consolas" panose="020B0609020204030204" pitchFamily="49" charset="0"/>
-              </a:rPr>
-              <a:t>prepublish</a:t>
-            </a:r>
-            <a:r>
-              <a:rPr lang="en-GB" sz="1000" dirty="0">
-                <a:latin typeface="Consolas" panose="020B0609020204030204" pitchFamily="49" charset="0"/>
-              </a:rPr>
-              <a:t>": [ "</a:t>
-            </a:r>
-            <a:r>
-              <a:rPr lang="en-GB" sz="1000" dirty="0" err="1">
-                <a:latin typeface="Consolas" panose="020B0609020204030204" pitchFamily="49" charset="0"/>
-              </a:rPr>
-              <a:t>npm</a:t>
-            </a:r>
-            <a:r>
-              <a:rPr lang="en-GB" sz="1000" dirty="0">
-                <a:latin typeface="Consolas" panose="020B0609020204030204" pitchFamily="49" charset="0"/>
-              </a:rPr>
-              <a:t> install", "bower install", "gulp clean", "gulp min" ]</a:t>
-            </a:r>
-          </a:p>
-          <a:p>
-            <a:r>
-              <a:rPr lang="en-GB" sz="1000" dirty="0">
-                <a:latin typeface="Consolas" panose="020B0609020204030204" pitchFamily="49" charset="0"/>
-              </a:rPr>
-              <a:t>  }</a:t>
-            </a:r>
-          </a:p>
-          <a:p>
-            <a:r>
-              <a:rPr lang="en-GB" sz="1000" dirty="0">
-                <a:latin typeface="Consolas" panose="020B0609020204030204" pitchFamily="49" charset="0"/>
-              </a:rPr>
-              <a:t>}</a:t>
-            </a:r>
-          </a:p>
-          <a:p>
-            <a:endParaRPr lang="en-GB" sz="1000" dirty="0">
-              <a:latin typeface="Consolas" panose="020B0609020204030204" pitchFamily="49" charset="0"/>
-            </a:endParaRPr>
-          </a:p>
-        </p:txBody>
-      </p:sp>
-    </p:spTree>
-    <p:extLst>
-      <p:ext uri="{BB962C8B-B14F-4D97-AF65-F5344CB8AC3E}">
-        <p14:creationId xmlns:p14="http://schemas.microsoft.com/office/powerpoint/2010/main" val="1217420251"/>
-      </p:ext>
-    </p:extLst>
-  </p:cSld>
-  <p:clrMapOvr>
-    <a:masterClrMapping/>
-  </p:clrMapOvr>
-  <p:timing>
-    <p:tnLst>
-      <p:par>
-        <p:cTn id="1" dur="indefinite" restart="never" nodeType="tmRoot"/>
-      </p:par>
-    </p:tnLst>
   </p:timing>
 </p:sld>
 </file>

</xml_diff>